<commit_message>
Updates for Release 1.0.0
</commit_message>
<xml_diff>
--- a/Light_theme.pptx
+++ b/Light_theme.pptx
@@ -8,7 +8,8 @@
     <p:sldId id="280" r:id="rId2"/>
     <p:sldId id="262" r:id="rId3"/>
     <p:sldId id="276" r:id="rId4"/>
-    <p:sldId id="275" r:id="rId5"/>
+    <p:sldId id="281" r:id="rId5"/>
+    <p:sldId id="275" r:id="rId6"/>
   </p:sldIdLst>
   <p:sldSz cx="12192000" cy="6858000"/>
   <p:notesSz cx="6858000" cy="9144000"/>
@@ -246,7 +247,7 @@
           <a:p>
             <a:fld id="{EB52B2A1-289A-4808-B0F9-4EC44A9C7A86}" type="datetimeFigureOut">
               <a:rPr lang="en-US" smtClean="0"/>
-              <a:t>11/8/2021</a:t>
+              <a:t>11/9/2021</a:t>
             </a:fld>
             <a:endParaRPr lang="en-US"/>
           </a:p>
@@ -416,7 +417,7 @@
           <a:p>
             <a:fld id="{EB52B2A1-289A-4808-B0F9-4EC44A9C7A86}" type="datetimeFigureOut">
               <a:rPr lang="en-US" smtClean="0"/>
-              <a:t>11/8/2021</a:t>
+              <a:t>11/9/2021</a:t>
             </a:fld>
             <a:endParaRPr lang="en-US"/>
           </a:p>
@@ -596,7 +597,7 @@
           <a:p>
             <a:fld id="{EB52B2A1-289A-4808-B0F9-4EC44A9C7A86}" type="datetimeFigureOut">
               <a:rPr lang="en-US" smtClean="0"/>
-              <a:t>11/8/2021</a:t>
+              <a:t>11/9/2021</a:t>
             </a:fld>
             <a:endParaRPr lang="en-US"/>
           </a:p>
@@ -766,7 +767,7 @@
           <a:p>
             <a:fld id="{EB52B2A1-289A-4808-B0F9-4EC44A9C7A86}" type="datetimeFigureOut">
               <a:rPr lang="en-US" smtClean="0"/>
-              <a:t>11/8/2021</a:t>
+              <a:t>11/9/2021</a:t>
             </a:fld>
             <a:endParaRPr lang="en-US"/>
           </a:p>
@@ -1012,7 +1013,7 @@
           <a:p>
             <a:fld id="{EB52B2A1-289A-4808-B0F9-4EC44A9C7A86}" type="datetimeFigureOut">
               <a:rPr lang="en-US" smtClean="0"/>
-              <a:t>11/8/2021</a:t>
+              <a:t>11/9/2021</a:t>
             </a:fld>
             <a:endParaRPr lang="en-US"/>
           </a:p>
@@ -1244,7 +1245,7 @@
           <a:p>
             <a:fld id="{EB52B2A1-289A-4808-B0F9-4EC44A9C7A86}" type="datetimeFigureOut">
               <a:rPr lang="en-US" smtClean="0"/>
-              <a:t>11/8/2021</a:t>
+              <a:t>11/9/2021</a:t>
             </a:fld>
             <a:endParaRPr lang="en-US"/>
           </a:p>
@@ -1611,7 +1612,7 @@
           <a:p>
             <a:fld id="{EB52B2A1-289A-4808-B0F9-4EC44A9C7A86}" type="datetimeFigureOut">
               <a:rPr lang="en-US" smtClean="0"/>
-              <a:t>11/8/2021</a:t>
+              <a:t>11/9/2021</a:t>
             </a:fld>
             <a:endParaRPr lang="en-US"/>
           </a:p>
@@ -1729,7 +1730,7 @@
           <a:p>
             <a:fld id="{EB52B2A1-289A-4808-B0F9-4EC44A9C7A86}" type="datetimeFigureOut">
               <a:rPr lang="en-US" smtClean="0"/>
-              <a:t>11/8/2021</a:t>
+              <a:t>11/9/2021</a:t>
             </a:fld>
             <a:endParaRPr lang="en-US"/>
           </a:p>
@@ -1824,7 +1825,7 @@
           <a:p>
             <a:fld id="{EB52B2A1-289A-4808-B0F9-4EC44A9C7A86}" type="datetimeFigureOut">
               <a:rPr lang="en-US" smtClean="0"/>
-              <a:t>11/8/2021</a:t>
+              <a:t>11/9/2021</a:t>
             </a:fld>
             <a:endParaRPr lang="en-US"/>
           </a:p>
@@ -2101,7 +2102,7 @@
           <a:p>
             <a:fld id="{EB52B2A1-289A-4808-B0F9-4EC44A9C7A86}" type="datetimeFigureOut">
               <a:rPr lang="en-US" smtClean="0"/>
-              <a:t>11/8/2021</a:t>
+              <a:t>11/9/2021</a:t>
             </a:fld>
             <a:endParaRPr lang="en-US"/>
           </a:p>
@@ -2354,7 +2355,7 @@
           <a:p>
             <a:fld id="{EB52B2A1-289A-4808-B0F9-4EC44A9C7A86}" type="datetimeFigureOut">
               <a:rPr lang="en-US" smtClean="0"/>
-              <a:t>11/8/2021</a:t>
+              <a:t>11/9/2021</a:t>
             </a:fld>
             <a:endParaRPr lang="en-US"/>
           </a:p>
@@ -2567,7 +2568,7 @@
           <a:p>
             <a:fld id="{EB52B2A1-289A-4808-B0F9-4EC44A9C7A86}" type="datetimeFigureOut">
               <a:rPr lang="en-US" smtClean="0"/>
-              <a:t>11/8/2021</a:t>
+              <a:t>11/9/2021</a:t>
             </a:fld>
             <a:endParaRPr lang="en-US"/>
           </a:p>
@@ -17906,6 +17907,2556 @@
 <file path=ppt/slides/slide4.xml><?xml version="1.0" encoding="utf-8"?>
 <p:sld xmlns:a="http://schemas.openxmlformats.org/drawingml/2006/main" xmlns:r="http://schemas.openxmlformats.org/officeDocument/2006/relationships" xmlns:p="http://schemas.openxmlformats.org/presentationml/2006/main">
   <p:cSld>
+    <p:spTree>
+      <p:nvGrpSpPr>
+        <p:cNvPr id="1" name=""/>
+        <p:cNvGrpSpPr/>
+        <p:nvPr/>
+      </p:nvGrpSpPr>
+      <p:grpSpPr>
+        <a:xfrm>
+          <a:off x="0" y="0"/>
+          <a:ext cx="0" cy="0"/>
+          <a:chOff x="0" y="0"/>
+          <a:chExt cx="0" cy="0"/>
+        </a:xfrm>
+      </p:grpSpPr>
+      <p:grpSp>
+        <p:nvGrpSpPr>
+          <p:cNvPr id="16" name="Groupe 15"/>
+          <p:cNvGrpSpPr/>
+          <p:nvPr/>
+        </p:nvGrpSpPr>
+        <p:grpSpPr>
+          <a:xfrm>
+            <a:off x="605446" y="320082"/>
+            <a:ext cx="3117572" cy="3121822"/>
+            <a:chOff x="605446" y="320082"/>
+            <a:chExt cx="3117572" cy="3121822"/>
+          </a:xfrm>
+        </p:grpSpPr>
+        <p:grpSp>
+          <p:nvGrpSpPr>
+            <p:cNvPr id="14" name="Groupe 13"/>
+            <p:cNvGrpSpPr/>
+            <p:nvPr/>
+          </p:nvGrpSpPr>
+          <p:grpSpPr>
+            <a:xfrm>
+              <a:off x="605446" y="320082"/>
+              <a:ext cx="3117572" cy="3121822"/>
+              <a:chOff x="605446" y="320082"/>
+              <a:chExt cx="3117572" cy="3121822"/>
+            </a:xfrm>
+          </p:grpSpPr>
+          <p:grpSp>
+            <p:nvGrpSpPr>
+              <p:cNvPr id="4" name="Groupe 3"/>
+              <p:cNvGrpSpPr/>
+              <p:nvPr/>
+            </p:nvGrpSpPr>
+            <p:grpSpPr>
+              <a:xfrm>
+                <a:off x="605446" y="320082"/>
+                <a:ext cx="3117572" cy="3121822"/>
+                <a:chOff x="1143387" y="3055508"/>
+                <a:chExt cx="3363190" cy="3467166"/>
+              </a:xfrm>
+            </p:grpSpPr>
+            <p:sp>
+              <p:nvSpPr>
+                <p:cNvPr id="5" name="Cube 4"/>
+                <p:cNvSpPr/>
+                <p:nvPr/>
+              </p:nvSpPr>
+              <p:spPr>
+                <a:xfrm>
+                  <a:off x="1143387" y="5588429"/>
+                  <a:ext cx="3363190" cy="934245"/>
+                </a:xfrm>
+                <a:prstGeom prst="cube">
+                  <a:avLst>
+                    <a:gd name="adj" fmla="val 88178"/>
+                  </a:avLst>
+                </a:prstGeom>
+                <a:solidFill>
+                  <a:srgbClr val="4A5565"/>
+                </a:solidFill>
+                <a:ln w="38100">
+                  <a:solidFill>
+                    <a:srgbClr val="4A5565"/>
+                  </a:solidFill>
+                </a:ln>
+              </p:spPr>
+              <p:style>
+                <a:lnRef idx="2">
+                  <a:schemeClr val="accent1">
+                    <a:shade val="50000"/>
+                  </a:schemeClr>
+                </a:lnRef>
+                <a:fillRef idx="1">
+                  <a:schemeClr val="accent1"/>
+                </a:fillRef>
+                <a:effectRef idx="0">
+                  <a:schemeClr val="accent1"/>
+                </a:effectRef>
+                <a:fontRef idx="minor">
+                  <a:schemeClr val="lt1"/>
+                </a:fontRef>
+              </p:style>
+              <p:txBody>
+                <a:bodyPr rtlCol="0" anchor="ctr"/>
+                <a:lstStyle/>
+                <a:p>
+                  <a:pPr algn="ctr"/>
+                  <a:endParaRPr lang="en-US"/>
+                </a:p>
+              </p:txBody>
+            </p:sp>
+            <p:grpSp>
+              <p:nvGrpSpPr>
+                <p:cNvPr id="6" name="Groupe 5"/>
+                <p:cNvGrpSpPr/>
+                <p:nvPr/>
+              </p:nvGrpSpPr>
+              <p:grpSpPr>
+                <a:xfrm>
+                  <a:off x="1143387" y="3055508"/>
+                  <a:ext cx="3363190" cy="3336240"/>
+                  <a:chOff x="1143387" y="3055508"/>
+                  <a:chExt cx="3363190" cy="3336240"/>
+                </a:xfrm>
+              </p:grpSpPr>
+              <p:grpSp>
+                <p:nvGrpSpPr>
+                  <p:cNvPr id="8" name="Groupe 7"/>
+                  <p:cNvGrpSpPr/>
+                  <p:nvPr/>
+                </p:nvGrpSpPr>
+                <p:grpSpPr>
+                  <a:xfrm>
+                    <a:off x="2017253" y="4199514"/>
+                    <a:ext cx="1918409" cy="1943551"/>
+                    <a:chOff x="1853471" y="4012579"/>
+                    <a:chExt cx="2000035" cy="2130486"/>
+                  </a:xfrm>
+                </p:grpSpPr>
+                <p:sp>
+                  <p:nvSpPr>
+                    <p:cNvPr id="10" name="Forme libre 9"/>
+                    <p:cNvSpPr/>
+                    <p:nvPr/>
+                  </p:nvSpPr>
+                  <p:spPr>
+                    <a:xfrm>
+                      <a:off x="1853471" y="4012579"/>
+                      <a:ext cx="2000035" cy="2130486"/>
+                    </a:xfrm>
+                    <a:custGeom>
+                      <a:avLst/>
+                      <a:gdLst>
+                        <a:gd name="connsiteX0" fmla="*/ 203682 w 1471648"/>
+                        <a:gd name="connsiteY0" fmla="*/ 66945 h 1407126"/>
+                        <a:gd name="connsiteX1" fmla="*/ 825982 w 1471648"/>
+                        <a:gd name="connsiteY1" fmla="*/ 3445 h 1407126"/>
+                        <a:gd name="connsiteX2" fmla="*/ 1372082 w 1471648"/>
+                        <a:gd name="connsiteY2" fmla="*/ 160925 h 1407126"/>
+                        <a:gd name="connsiteX3" fmla="*/ 1420342 w 1471648"/>
+                        <a:gd name="connsiteY3" fmla="*/ 221885 h 1407126"/>
+                        <a:gd name="connsiteX4" fmla="*/ 1471142 w 1471648"/>
+                        <a:gd name="connsiteY4" fmla="*/ 361585 h 1407126"/>
+                        <a:gd name="connsiteX5" fmla="*/ 1440662 w 1471648"/>
+                        <a:gd name="connsiteY5" fmla="*/ 1113425 h 1407126"/>
+                        <a:gd name="connsiteX6" fmla="*/ 1351762 w 1471648"/>
+                        <a:gd name="connsiteY6" fmla="*/ 1225185 h 1407126"/>
+                        <a:gd name="connsiteX7" fmla="*/ 605002 w 1471648"/>
+                        <a:gd name="connsiteY7" fmla="*/ 1395365 h 1407126"/>
+                        <a:gd name="connsiteX8" fmla="*/ 450062 w 1471648"/>
+                        <a:gd name="connsiteY8" fmla="*/ 1377585 h 1407126"/>
+                        <a:gd name="connsiteX9" fmla="*/ 259562 w 1471648"/>
+                        <a:gd name="connsiteY9" fmla="*/ 1258205 h 1407126"/>
+                        <a:gd name="connsiteX10" fmla="*/ 79222 w 1471648"/>
+                        <a:gd name="connsiteY10" fmla="*/ 1100725 h 1407126"/>
+                        <a:gd name="connsiteX11" fmla="*/ 43662 w 1471648"/>
+                        <a:gd name="connsiteY11" fmla="*/ 1037225 h 1407126"/>
+                        <a:gd name="connsiteX12" fmla="*/ 10642 w 1471648"/>
+                        <a:gd name="connsiteY12" fmla="*/ 234585 h 1407126"/>
+                        <a:gd name="connsiteX13" fmla="*/ 203682 w 1471648"/>
+                        <a:gd name="connsiteY13" fmla="*/ 66945 h 1407126"/>
+                        <a:gd name="connsiteX0" fmla="*/ 203682 w 1471434"/>
+                        <a:gd name="connsiteY0" fmla="*/ 66945 h 1407126"/>
+                        <a:gd name="connsiteX1" fmla="*/ 825982 w 1471434"/>
+                        <a:gd name="connsiteY1" fmla="*/ 3445 h 1407126"/>
+                        <a:gd name="connsiteX2" fmla="*/ 1372082 w 1471434"/>
+                        <a:gd name="connsiteY2" fmla="*/ 160925 h 1407126"/>
+                        <a:gd name="connsiteX3" fmla="*/ 1450822 w 1471434"/>
+                        <a:gd name="connsiteY3" fmla="*/ 235220 h 1407126"/>
+                        <a:gd name="connsiteX4" fmla="*/ 1471142 w 1471434"/>
+                        <a:gd name="connsiteY4" fmla="*/ 361585 h 1407126"/>
+                        <a:gd name="connsiteX5" fmla="*/ 1440662 w 1471434"/>
+                        <a:gd name="connsiteY5" fmla="*/ 1113425 h 1407126"/>
+                        <a:gd name="connsiteX6" fmla="*/ 1351762 w 1471434"/>
+                        <a:gd name="connsiteY6" fmla="*/ 1225185 h 1407126"/>
+                        <a:gd name="connsiteX7" fmla="*/ 605002 w 1471434"/>
+                        <a:gd name="connsiteY7" fmla="*/ 1395365 h 1407126"/>
+                        <a:gd name="connsiteX8" fmla="*/ 450062 w 1471434"/>
+                        <a:gd name="connsiteY8" fmla="*/ 1377585 h 1407126"/>
+                        <a:gd name="connsiteX9" fmla="*/ 259562 w 1471434"/>
+                        <a:gd name="connsiteY9" fmla="*/ 1258205 h 1407126"/>
+                        <a:gd name="connsiteX10" fmla="*/ 79222 w 1471434"/>
+                        <a:gd name="connsiteY10" fmla="*/ 1100725 h 1407126"/>
+                        <a:gd name="connsiteX11" fmla="*/ 43662 w 1471434"/>
+                        <a:gd name="connsiteY11" fmla="*/ 1037225 h 1407126"/>
+                        <a:gd name="connsiteX12" fmla="*/ 10642 w 1471434"/>
+                        <a:gd name="connsiteY12" fmla="*/ 234585 h 1407126"/>
+                        <a:gd name="connsiteX13" fmla="*/ 203682 w 1471434"/>
+                        <a:gd name="connsiteY13" fmla="*/ 66945 h 1407126"/>
+                        <a:gd name="connsiteX0" fmla="*/ 203682 w 1472423"/>
+                        <a:gd name="connsiteY0" fmla="*/ 66140 h 1406321"/>
+                        <a:gd name="connsiteX1" fmla="*/ 825982 w 1472423"/>
+                        <a:gd name="connsiteY1" fmla="*/ 2640 h 1406321"/>
+                        <a:gd name="connsiteX2" fmla="*/ 1314932 w 1472423"/>
+                        <a:gd name="connsiteY2" fmla="*/ 144880 h 1406321"/>
+                        <a:gd name="connsiteX3" fmla="*/ 1450822 w 1472423"/>
+                        <a:gd name="connsiteY3" fmla="*/ 234415 h 1406321"/>
+                        <a:gd name="connsiteX4" fmla="*/ 1471142 w 1472423"/>
+                        <a:gd name="connsiteY4" fmla="*/ 360780 h 1406321"/>
+                        <a:gd name="connsiteX5" fmla="*/ 1440662 w 1472423"/>
+                        <a:gd name="connsiteY5" fmla="*/ 1112620 h 1406321"/>
+                        <a:gd name="connsiteX6" fmla="*/ 1351762 w 1472423"/>
+                        <a:gd name="connsiteY6" fmla="*/ 1224380 h 1406321"/>
+                        <a:gd name="connsiteX7" fmla="*/ 605002 w 1472423"/>
+                        <a:gd name="connsiteY7" fmla="*/ 1394560 h 1406321"/>
+                        <a:gd name="connsiteX8" fmla="*/ 450062 w 1472423"/>
+                        <a:gd name="connsiteY8" fmla="*/ 1376780 h 1406321"/>
+                        <a:gd name="connsiteX9" fmla="*/ 259562 w 1472423"/>
+                        <a:gd name="connsiteY9" fmla="*/ 1257400 h 1406321"/>
+                        <a:gd name="connsiteX10" fmla="*/ 79222 w 1472423"/>
+                        <a:gd name="connsiteY10" fmla="*/ 1099920 h 1406321"/>
+                        <a:gd name="connsiteX11" fmla="*/ 43662 w 1472423"/>
+                        <a:gd name="connsiteY11" fmla="*/ 1036420 h 1406321"/>
+                        <a:gd name="connsiteX12" fmla="*/ 10642 w 1472423"/>
+                        <a:gd name="connsiteY12" fmla="*/ 233780 h 1406321"/>
+                        <a:gd name="connsiteX13" fmla="*/ 203682 w 1472423"/>
+                        <a:gd name="connsiteY13" fmla="*/ 66140 h 1406321"/>
+                        <a:gd name="connsiteX0" fmla="*/ 203682 w 1475396"/>
+                        <a:gd name="connsiteY0" fmla="*/ 64878 h 1405059"/>
+                        <a:gd name="connsiteX1" fmla="*/ 825982 w 1475396"/>
+                        <a:gd name="connsiteY1" fmla="*/ 1378 h 1405059"/>
+                        <a:gd name="connsiteX2" fmla="*/ 1252067 w 1475396"/>
+                        <a:gd name="connsiteY2" fmla="*/ 116948 h 1405059"/>
+                        <a:gd name="connsiteX3" fmla="*/ 1450822 w 1475396"/>
+                        <a:gd name="connsiteY3" fmla="*/ 233153 h 1405059"/>
+                        <a:gd name="connsiteX4" fmla="*/ 1471142 w 1475396"/>
+                        <a:gd name="connsiteY4" fmla="*/ 359518 h 1405059"/>
+                        <a:gd name="connsiteX5" fmla="*/ 1440662 w 1475396"/>
+                        <a:gd name="connsiteY5" fmla="*/ 1111358 h 1405059"/>
+                        <a:gd name="connsiteX6" fmla="*/ 1351762 w 1475396"/>
+                        <a:gd name="connsiteY6" fmla="*/ 1223118 h 1405059"/>
+                        <a:gd name="connsiteX7" fmla="*/ 605002 w 1475396"/>
+                        <a:gd name="connsiteY7" fmla="*/ 1393298 h 1405059"/>
+                        <a:gd name="connsiteX8" fmla="*/ 450062 w 1475396"/>
+                        <a:gd name="connsiteY8" fmla="*/ 1375518 h 1405059"/>
+                        <a:gd name="connsiteX9" fmla="*/ 259562 w 1475396"/>
+                        <a:gd name="connsiteY9" fmla="*/ 1256138 h 1405059"/>
+                        <a:gd name="connsiteX10" fmla="*/ 79222 w 1475396"/>
+                        <a:gd name="connsiteY10" fmla="*/ 1098658 h 1405059"/>
+                        <a:gd name="connsiteX11" fmla="*/ 43662 w 1475396"/>
+                        <a:gd name="connsiteY11" fmla="*/ 1035158 h 1405059"/>
+                        <a:gd name="connsiteX12" fmla="*/ 10642 w 1475396"/>
+                        <a:gd name="connsiteY12" fmla="*/ 232518 h 1405059"/>
+                        <a:gd name="connsiteX13" fmla="*/ 203682 w 1475396"/>
+                        <a:gd name="connsiteY13" fmla="*/ 64878 h 1405059"/>
+                        <a:gd name="connsiteX0" fmla="*/ 203682 w 1475395"/>
+                        <a:gd name="connsiteY0" fmla="*/ 64878 h 1405059"/>
+                        <a:gd name="connsiteX1" fmla="*/ 825982 w 1475395"/>
+                        <a:gd name="connsiteY1" fmla="*/ 1378 h 1405059"/>
+                        <a:gd name="connsiteX2" fmla="*/ 1252067 w 1475395"/>
+                        <a:gd name="connsiteY2" fmla="*/ 116948 h 1405059"/>
+                        <a:gd name="connsiteX3" fmla="*/ 1450822 w 1475395"/>
+                        <a:gd name="connsiteY3" fmla="*/ 233153 h 1405059"/>
+                        <a:gd name="connsiteX4" fmla="*/ 1471142 w 1475395"/>
+                        <a:gd name="connsiteY4" fmla="*/ 428098 h 1405059"/>
+                        <a:gd name="connsiteX5" fmla="*/ 1440662 w 1475395"/>
+                        <a:gd name="connsiteY5" fmla="*/ 1111358 h 1405059"/>
+                        <a:gd name="connsiteX6" fmla="*/ 1351762 w 1475395"/>
+                        <a:gd name="connsiteY6" fmla="*/ 1223118 h 1405059"/>
+                        <a:gd name="connsiteX7" fmla="*/ 605002 w 1475395"/>
+                        <a:gd name="connsiteY7" fmla="*/ 1393298 h 1405059"/>
+                        <a:gd name="connsiteX8" fmla="*/ 450062 w 1475395"/>
+                        <a:gd name="connsiteY8" fmla="*/ 1375518 h 1405059"/>
+                        <a:gd name="connsiteX9" fmla="*/ 259562 w 1475395"/>
+                        <a:gd name="connsiteY9" fmla="*/ 1256138 h 1405059"/>
+                        <a:gd name="connsiteX10" fmla="*/ 79222 w 1475395"/>
+                        <a:gd name="connsiteY10" fmla="*/ 1098658 h 1405059"/>
+                        <a:gd name="connsiteX11" fmla="*/ 43662 w 1475395"/>
+                        <a:gd name="connsiteY11" fmla="*/ 1035158 h 1405059"/>
+                        <a:gd name="connsiteX12" fmla="*/ 10642 w 1475395"/>
+                        <a:gd name="connsiteY12" fmla="*/ 232518 h 1405059"/>
+                        <a:gd name="connsiteX13" fmla="*/ 203682 w 1475395"/>
+                        <a:gd name="connsiteY13" fmla="*/ 64878 h 1405059"/>
+                        <a:gd name="connsiteX0" fmla="*/ 203682 w 1472461"/>
+                        <a:gd name="connsiteY0" fmla="*/ 64878 h 1405059"/>
+                        <a:gd name="connsiteX1" fmla="*/ 825982 w 1472461"/>
+                        <a:gd name="connsiteY1" fmla="*/ 1378 h 1405059"/>
+                        <a:gd name="connsiteX2" fmla="*/ 1252067 w 1472461"/>
+                        <a:gd name="connsiteY2" fmla="*/ 116948 h 1405059"/>
+                        <a:gd name="connsiteX3" fmla="*/ 1450822 w 1472461"/>
+                        <a:gd name="connsiteY3" fmla="*/ 233153 h 1405059"/>
+                        <a:gd name="connsiteX4" fmla="*/ 1471142 w 1472461"/>
+                        <a:gd name="connsiteY4" fmla="*/ 428098 h 1405059"/>
+                        <a:gd name="connsiteX5" fmla="*/ 1440662 w 1472461"/>
+                        <a:gd name="connsiteY5" fmla="*/ 1111358 h 1405059"/>
+                        <a:gd name="connsiteX6" fmla="*/ 1351762 w 1472461"/>
+                        <a:gd name="connsiteY6" fmla="*/ 1223118 h 1405059"/>
+                        <a:gd name="connsiteX7" fmla="*/ 605002 w 1472461"/>
+                        <a:gd name="connsiteY7" fmla="*/ 1393298 h 1405059"/>
+                        <a:gd name="connsiteX8" fmla="*/ 450062 w 1472461"/>
+                        <a:gd name="connsiteY8" fmla="*/ 1375518 h 1405059"/>
+                        <a:gd name="connsiteX9" fmla="*/ 259562 w 1472461"/>
+                        <a:gd name="connsiteY9" fmla="*/ 1256138 h 1405059"/>
+                        <a:gd name="connsiteX10" fmla="*/ 79222 w 1472461"/>
+                        <a:gd name="connsiteY10" fmla="*/ 1098658 h 1405059"/>
+                        <a:gd name="connsiteX11" fmla="*/ 43662 w 1472461"/>
+                        <a:gd name="connsiteY11" fmla="*/ 1035158 h 1405059"/>
+                        <a:gd name="connsiteX12" fmla="*/ 10642 w 1472461"/>
+                        <a:gd name="connsiteY12" fmla="*/ 232518 h 1405059"/>
+                        <a:gd name="connsiteX13" fmla="*/ 203682 w 1472461"/>
+                        <a:gd name="connsiteY13" fmla="*/ 64878 h 1405059"/>
+                        <a:gd name="connsiteX0" fmla="*/ 203682 w 1476170"/>
+                        <a:gd name="connsiteY0" fmla="*/ 64878 h 1405059"/>
+                        <a:gd name="connsiteX1" fmla="*/ 825982 w 1476170"/>
+                        <a:gd name="connsiteY1" fmla="*/ 1378 h 1405059"/>
+                        <a:gd name="connsiteX2" fmla="*/ 1252067 w 1476170"/>
+                        <a:gd name="connsiteY2" fmla="*/ 116948 h 1405059"/>
+                        <a:gd name="connsiteX3" fmla="*/ 1450822 w 1476170"/>
+                        <a:gd name="connsiteY3" fmla="*/ 233153 h 1405059"/>
+                        <a:gd name="connsiteX4" fmla="*/ 1471142 w 1476170"/>
+                        <a:gd name="connsiteY4" fmla="*/ 428098 h 1405059"/>
+                        <a:gd name="connsiteX5" fmla="*/ 1440662 w 1476170"/>
+                        <a:gd name="connsiteY5" fmla="*/ 1111358 h 1405059"/>
+                        <a:gd name="connsiteX6" fmla="*/ 1351762 w 1476170"/>
+                        <a:gd name="connsiteY6" fmla="*/ 1223118 h 1405059"/>
+                        <a:gd name="connsiteX7" fmla="*/ 605002 w 1476170"/>
+                        <a:gd name="connsiteY7" fmla="*/ 1393298 h 1405059"/>
+                        <a:gd name="connsiteX8" fmla="*/ 450062 w 1476170"/>
+                        <a:gd name="connsiteY8" fmla="*/ 1375518 h 1405059"/>
+                        <a:gd name="connsiteX9" fmla="*/ 259562 w 1476170"/>
+                        <a:gd name="connsiteY9" fmla="*/ 1256138 h 1405059"/>
+                        <a:gd name="connsiteX10" fmla="*/ 79222 w 1476170"/>
+                        <a:gd name="connsiteY10" fmla="*/ 1098658 h 1405059"/>
+                        <a:gd name="connsiteX11" fmla="*/ 43662 w 1476170"/>
+                        <a:gd name="connsiteY11" fmla="*/ 1035158 h 1405059"/>
+                        <a:gd name="connsiteX12" fmla="*/ 10642 w 1476170"/>
+                        <a:gd name="connsiteY12" fmla="*/ 232518 h 1405059"/>
+                        <a:gd name="connsiteX13" fmla="*/ 203682 w 1476170"/>
+                        <a:gd name="connsiteY13" fmla="*/ 64878 h 1405059"/>
+                        <a:gd name="connsiteX0" fmla="*/ 203682 w 1482445"/>
+                        <a:gd name="connsiteY0" fmla="*/ 64878 h 1405059"/>
+                        <a:gd name="connsiteX1" fmla="*/ 825982 w 1482445"/>
+                        <a:gd name="connsiteY1" fmla="*/ 1378 h 1405059"/>
+                        <a:gd name="connsiteX2" fmla="*/ 1252067 w 1482445"/>
+                        <a:gd name="connsiteY2" fmla="*/ 116948 h 1405059"/>
+                        <a:gd name="connsiteX3" fmla="*/ 1471142 w 1482445"/>
+                        <a:gd name="connsiteY3" fmla="*/ 428098 h 1405059"/>
+                        <a:gd name="connsiteX4" fmla="*/ 1440662 w 1482445"/>
+                        <a:gd name="connsiteY4" fmla="*/ 1111358 h 1405059"/>
+                        <a:gd name="connsiteX5" fmla="*/ 1351762 w 1482445"/>
+                        <a:gd name="connsiteY5" fmla="*/ 1223118 h 1405059"/>
+                        <a:gd name="connsiteX6" fmla="*/ 605002 w 1482445"/>
+                        <a:gd name="connsiteY6" fmla="*/ 1393298 h 1405059"/>
+                        <a:gd name="connsiteX7" fmla="*/ 450062 w 1482445"/>
+                        <a:gd name="connsiteY7" fmla="*/ 1375518 h 1405059"/>
+                        <a:gd name="connsiteX8" fmla="*/ 259562 w 1482445"/>
+                        <a:gd name="connsiteY8" fmla="*/ 1256138 h 1405059"/>
+                        <a:gd name="connsiteX9" fmla="*/ 79222 w 1482445"/>
+                        <a:gd name="connsiteY9" fmla="*/ 1098658 h 1405059"/>
+                        <a:gd name="connsiteX10" fmla="*/ 43662 w 1482445"/>
+                        <a:gd name="connsiteY10" fmla="*/ 1035158 h 1405059"/>
+                        <a:gd name="connsiteX11" fmla="*/ 10642 w 1482445"/>
+                        <a:gd name="connsiteY11" fmla="*/ 232518 h 1405059"/>
+                        <a:gd name="connsiteX12" fmla="*/ 203682 w 1482445"/>
+                        <a:gd name="connsiteY12" fmla="*/ 64878 h 1405059"/>
+                        <a:gd name="connsiteX0" fmla="*/ 203682 w 1474638"/>
+                        <a:gd name="connsiteY0" fmla="*/ 66842 h 1407023"/>
+                        <a:gd name="connsiteX1" fmla="*/ 825982 w 1474638"/>
+                        <a:gd name="connsiteY1" fmla="*/ 3342 h 1407023"/>
+                        <a:gd name="connsiteX2" fmla="*/ 1366367 w 1474638"/>
+                        <a:gd name="connsiteY2" fmla="*/ 158917 h 1407023"/>
+                        <a:gd name="connsiteX3" fmla="*/ 1471142 w 1474638"/>
+                        <a:gd name="connsiteY3" fmla="*/ 430062 h 1407023"/>
+                        <a:gd name="connsiteX4" fmla="*/ 1440662 w 1474638"/>
+                        <a:gd name="connsiteY4" fmla="*/ 1113322 h 1407023"/>
+                        <a:gd name="connsiteX5" fmla="*/ 1351762 w 1474638"/>
+                        <a:gd name="connsiteY5" fmla="*/ 1225082 h 1407023"/>
+                        <a:gd name="connsiteX6" fmla="*/ 605002 w 1474638"/>
+                        <a:gd name="connsiteY6" fmla="*/ 1395262 h 1407023"/>
+                        <a:gd name="connsiteX7" fmla="*/ 450062 w 1474638"/>
+                        <a:gd name="connsiteY7" fmla="*/ 1377482 h 1407023"/>
+                        <a:gd name="connsiteX8" fmla="*/ 259562 w 1474638"/>
+                        <a:gd name="connsiteY8" fmla="*/ 1258102 h 1407023"/>
+                        <a:gd name="connsiteX9" fmla="*/ 79222 w 1474638"/>
+                        <a:gd name="connsiteY9" fmla="*/ 1100622 h 1407023"/>
+                        <a:gd name="connsiteX10" fmla="*/ 43662 w 1474638"/>
+                        <a:gd name="connsiteY10" fmla="*/ 1037122 h 1407023"/>
+                        <a:gd name="connsiteX11" fmla="*/ 10642 w 1474638"/>
+                        <a:gd name="connsiteY11" fmla="*/ 234482 h 1407023"/>
+                        <a:gd name="connsiteX12" fmla="*/ 203682 w 1474638"/>
+                        <a:gd name="connsiteY12" fmla="*/ 66842 h 1407023"/>
+                        <a:gd name="connsiteX0" fmla="*/ 203682 w 1474638"/>
+                        <a:gd name="connsiteY0" fmla="*/ 63237 h 1403418"/>
+                        <a:gd name="connsiteX1" fmla="*/ 883132 w 1474638"/>
+                        <a:gd name="connsiteY1" fmla="*/ 3547 h 1403418"/>
+                        <a:gd name="connsiteX2" fmla="*/ 1366367 w 1474638"/>
+                        <a:gd name="connsiteY2" fmla="*/ 155312 h 1403418"/>
+                        <a:gd name="connsiteX3" fmla="*/ 1471142 w 1474638"/>
+                        <a:gd name="connsiteY3" fmla="*/ 426457 h 1403418"/>
+                        <a:gd name="connsiteX4" fmla="*/ 1440662 w 1474638"/>
+                        <a:gd name="connsiteY4" fmla="*/ 1109717 h 1403418"/>
+                        <a:gd name="connsiteX5" fmla="*/ 1351762 w 1474638"/>
+                        <a:gd name="connsiteY5" fmla="*/ 1221477 h 1403418"/>
+                        <a:gd name="connsiteX6" fmla="*/ 605002 w 1474638"/>
+                        <a:gd name="connsiteY6" fmla="*/ 1391657 h 1403418"/>
+                        <a:gd name="connsiteX7" fmla="*/ 450062 w 1474638"/>
+                        <a:gd name="connsiteY7" fmla="*/ 1373877 h 1403418"/>
+                        <a:gd name="connsiteX8" fmla="*/ 259562 w 1474638"/>
+                        <a:gd name="connsiteY8" fmla="*/ 1254497 h 1403418"/>
+                        <a:gd name="connsiteX9" fmla="*/ 79222 w 1474638"/>
+                        <a:gd name="connsiteY9" fmla="*/ 1097017 h 1403418"/>
+                        <a:gd name="connsiteX10" fmla="*/ 43662 w 1474638"/>
+                        <a:gd name="connsiteY10" fmla="*/ 1033517 h 1403418"/>
+                        <a:gd name="connsiteX11" fmla="*/ 10642 w 1474638"/>
+                        <a:gd name="connsiteY11" fmla="*/ 230877 h 1403418"/>
+                        <a:gd name="connsiteX12" fmla="*/ 203682 w 1474638"/>
+                        <a:gd name="connsiteY12" fmla="*/ 63237 h 1403418"/>
+                        <a:gd name="connsiteX0" fmla="*/ 203682 w 1464513"/>
+                        <a:gd name="connsiteY0" fmla="*/ 63237 h 1403418"/>
+                        <a:gd name="connsiteX1" fmla="*/ 883132 w 1464513"/>
+                        <a:gd name="connsiteY1" fmla="*/ 3547 h 1403418"/>
+                        <a:gd name="connsiteX2" fmla="*/ 1366367 w 1464513"/>
+                        <a:gd name="connsiteY2" fmla="*/ 155312 h 1403418"/>
+                        <a:gd name="connsiteX3" fmla="*/ 1459712 w 1464513"/>
+                        <a:gd name="connsiteY3" fmla="*/ 376927 h 1403418"/>
+                        <a:gd name="connsiteX4" fmla="*/ 1440662 w 1464513"/>
+                        <a:gd name="connsiteY4" fmla="*/ 1109717 h 1403418"/>
+                        <a:gd name="connsiteX5" fmla="*/ 1351762 w 1464513"/>
+                        <a:gd name="connsiteY5" fmla="*/ 1221477 h 1403418"/>
+                        <a:gd name="connsiteX6" fmla="*/ 605002 w 1464513"/>
+                        <a:gd name="connsiteY6" fmla="*/ 1391657 h 1403418"/>
+                        <a:gd name="connsiteX7" fmla="*/ 450062 w 1464513"/>
+                        <a:gd name="connsiteY7" fmla="*/ 1373877 h 1403418"/>
+                        <a:gd name="connsiteX8" fmla="*/ 259562 w 1464513"/>
+                        <a:gd name="connsiteY8" fmla="*/ 1254497 h 1403418"/>
+                        <a:gd name="connsiteX9" fmla="*/ 79222 w 1464513"/>
+                        <a:gd name="connsiteY9" fmla="*/ 1097017 h 1403418"/>
+                        <a:gd name="connsiteX10" fmla="*/ 43662 w 1464513"/>
+                        <a:gd name="connsiteY10" fmla="*/ 1033517 h 1403418"/>
+                        <a:gd name="connsiteX11" fmla="*/ 10642 w 1464513"/>
+                        <a:gd name="connsiteY11" fmla="*/ 230877 h 1403418"/>
+                        <a:gd name="connsiteX12" fmla="*/ 203682 w 1464513"/>
+                        <a:gd name="connsiteY12" fmla="*/ 63237 h 1403418"/>
+                        <a:gd name="connsiteX0" fmla="*/ 203682 w 1463693"/>
+                        <a:gd name="connsiteY0" fmla="*/ 63237 h 1403418"/>
+                        <a:gd name="connsiteX1" fmla="*/ 883132 w 1463693"/>
+                        <a:gd name="connsiteY1" fmla="*/ 3547 h 1403418"/>
+                        <a:gd name="connsiteX2" fmla="*/ 1366367 w 1463693"/>
+                        <a:gd name="connsiteY2" fmla="*/ 155312 h 1403418"/>
+                        <a:gd name="connsiteX3" fmla="*/ 1459712 w 1463693"/>
+                        <a:gd name="connsiteY3" fmla="*/ 376927 h 1403418"/>
+                        <a:gd name="connsiteX4" fmla="*/ 1440662 w 1463693"/>
+                        <a:gd name="connsiteY4" fmla="*/ 1109717 h 1403418"/>
+                        <a:gd name="connsiteX5" fmla="*/ 1351762 w 1463693"/>
+                        <a:gd name="connsiteY5" fmla="*/ 1221477 h 1403418"/>
+                        <a:gd name="connsiteX6" fmla="*/ 605002 w 1463693"/>
+                        <a:gd name="connsiteY6" fmla="*/ 1391657 h 1403418"/>
+                        <a:gd name="connsiteX7" fmla="*/ 450062 w 1463693"/>
+                        <a:gd name="connsiteY7" fmla="*/ 1373877 h 1403418"/>
+                        <a:gd name="connsiteX8" fmla="*/ 259562 w 1463693"/>
+                        <a:gd name="connsiteY8" fmla="*/ 1254497 h 1403418"/>
+                        <a:gd name="connsiteX9" fmla="*/ 79222 w 1463693"/>
+                        <a:gd name="connsiteY9" fmla="*/ 1097017 h 1403418"/>
+                        <a:gd name="connsiteX10" fmla="*/ 43662 w 1463693"/>
+                        <a:gd name="connsiteY10" fmla="*/ 1033517 h 1403418"/>
+                        <a:gd name="connsiteX11" fmla="*/ 10642 w 1463693"/>
+                        <a:gd name="connsiteY11" fmla="*/ 230877 h 1403418"/>
+                        <a:gd name="connsiteX12" fmla="*/ 203682 w 1463693"/>
+                        <a:gd name="connsiteY12" fmla="*/ 63237 h 1403418"/>
+                        <a:gd name="connsiteX0" fmla="*/ 203682 w 1466850"/>
+                        <a:gd name="connsiteY0" fmla="*/ 63237 h 1403418"/>
+                        <a:gd name="connsiteX1" fmla="*/ 883132 w 1466850"/>
+                        <a:gd name="connsiteY1" fmla="*/ 3547 h 1403418"/>
+                        <a:gd name="connsiteX2" fmla="*/ 1366367 w 1466850"/>
+                        <a:gd name="connsiteY2" fmla="*/ 155312 h 1403418"/>
+                        <a:gd name="connsiteX3" fmla="*/ 1459712 w 1466850"/>
+                        <a:gd name="connsiteY3" fmla="*/ 376927 h 1403418"/>
+                        <a:gd name="connsiteX4" fmla="*/ 1448282 w 1466850"/>
+                        <a:gd name="connsiteY4" fmla="*/ 991607 h 1403418"/>
+                        <a:gd name="connsiteX5" fmla="*/ 1351762 w 1466850"/>
+                        <a:gd name="connsiteY5" fmla="*/ 1221477 h 1403418"/>
+                        <a:gd name="connsiteX6" fmla="*/ 605002 w 1466850"/>
+                        <a:gd name="connsiteY6" fmla="*/ 1391657 h 1403418"/>
+                        <a:gd name="connsiteX7" fmla="*/ 450062 w 1466850"/>
+                        <a:gd name="connsiteY7" fmla="*/ 1373877 h 1403418"/>
+                        <a:gd name="connsiteX8" fmla="*/ 259562 w 1466850"/>
+                        <a:gd name="connsiteY8" fmla="*/ 1254497 h 1403418"/>
+                        <a:gd name="connsiteX9" fmla="*/ 79222 w 1466850"/>
+                        <a:gd name="connsiteY9" fmla="*/ 1097017 h 1403418"/>
+                        <a:gd name="connsiteX10" fmla="*/ 43662 w 1466850"/>
+                        <a:gd name="connsiteY10" fmla="*/ 1033517 h 1403418"/>
+                        <a:gd name="connsiteX11" fmla="*/ 10642 w 1466850"/>
+                        <a:gd name="connsiteY11" fmla="*/ 230877 h 1403418"/>
+                        <a:gd name="connsiteX12" fmla="*/ 203682 w 1466850"/>
+                        <a:gd name="connsiteY12" fmla="*/ 63237 h 1403418"/>
+                        <a:gd name="connsiteX0" fmla="*/ 203682 w 1468327"/>
+                        <a:gd name="connsiteY0" fmla="*/ 63237 h 1402712"/>
+                        <a:gd name="connsiteX1" fmla="*/ 883132 w 1468327"/>
+                        <a:gd name="connsiteY1" fmla="*/ 3547 h 1402712"/>
+                        <a:gd name="connsiteX2" fmla="*/ 1366367 w 1468327"/>
+                        <a:gd name="connsiteY2" fmla="*/ 155312 h 1402712"/>
+                        <a:gd name="connsiteX3" fmla="*/ 1459712 w 1468327"/>
+                        <a:gd name="connsiteY3" fmla="*/ 376927 h 1402712"/>
+                        <a:gd name="connsiteX4" fmla="*/ 1448282 w 1468327"/>
+                        <a:gd name="connsiteY4" fmla="*/ 991607 h 1402712"/>
+                        <a:gd name="connsiteX5" fmla="*/ 1319377 w 1468327"/>
+                        <a:gd name="connsiteY5" fmla="*/ 1231002 h 1402712"/>
+                        <a:gd name="connsiteX6" fmla="*/ 605002 w 1468327"/>
+                        <a:gd name="connsiteY6" fmla="*/ 1391657 h 1402712"/>
+                        <a:gd name="connsiteX7" fmla="*/ 450062 w 1468327"/>
+                        <a:gd name="connsiteY7" fmla="*/ 1373877 h 1402712"/>
+                        <a:gd name="connsiteX8" fmla="*/ 259562 w 1468327"/>
+                        <a:gd name="connsiteY8" fmla="*/ 1254497 h 1402712"/>
+                        <a:gd name="connsiteX9" fmla="*/ 79222 w 1468327"/>
+                        <a:gd name="connsiteY9" fmla="*/ 1097017 h 1402712"/>
+                        <a:gd name="connsiteX10" fmla="*/ 43662 w 1468327"/>
+                        <a:gd name="connsiteY10" fmla="*/ 1033517 h 1402712"/>
+                        <a:gd name="connsiteX11" fmla="*/ 10642 w 1468327"/>
+                        <a:gd name="connsiteY11" fmla="*/ 230877 h 1402712"/>
+                        <a:gd name="connsiteX12" fmla="*/ 203682 w 1468327"/>
+                        <a:gd name="connsiteY12" fmla="*/ 63237 h 1402712"/>
+                        <a:gd name="connsiteX0" fmla="*/ 203682 w 1463636"/>
+                        <a:gd name="connsiteY0" fmla="*/ 63237 h 1402712"/>
+                        <a:gd name="connsiteX1" fmla="*/ 883132 w 1463636"/>
+                        <a:gd name="connsiteY1" fmla="*/ 3547 h 1402712"/>
+                        <a:gd name="connsiteX2" fmla="*/ 1366367 w 1463636"/>
+                        <a:gd name="connsiteY2" fmla="*/ 155312 h 1402712"/>
+                        <a:gd name="connsiteX3" fmla="*/ 1459712 w 1463636"/>
+                        <a:gd name="connsiteY3" fmla="*/ 376927 h 1402712"/>
+                        <a:gd name="connsiteX4" fmla="*/ 1448282 w 1463636"/>
+                        <a:gd name="connsiteY4" fmla="*/ 991607 h 1402712"/>
+                        <a:gd name="connsiteX5" fmla="*/ 1319377 w 1463636"/>
+                        <a:gd name="connsiteY5" fmla="*/ 1231002 h 1402712"/>
+                        <a:gd name="connsiteX6" fmla="*/ 605002 w 1463636"/>
+                        <a:gd name="connsiteY6" fmla="*/ 1391657 h 1402712"/>
+                        <a:gd name="connsiteX7" fmla="*/ 450062 w 1463636"/>
+                        <a:gd name="connsiteY7" fmla="*/ 1373877 h 1402712"/>
+                        <a:gd name="connsiteX8" fmla="*/ 259562 w 1463636"/>
+                        <a:gd name="connsiteY8" fmla="*/ 1254497 h 1402712"/>
+                        <a:gd name="connsiteX9" fmla="*/ 79222 w 1463636"/>
+                        <a:gd name="connsiteY9" fmla="*/ 1097017 h 1402712"/>
+                        <a:gd name="connsiteX10" fmla="*/ 43662 w 1463636"/>
+                        <a:gd name="connsiteY10" fmla="*/ 1033517 h 1402712"/>
+                        <a:gd name="connsiteX11" fmla="*/ 10642 w 1463636"/>
+                        <a:gd name="connsiteY11" fmla="*/ 230877 h 1402712"/>
+                        <a:gd name="connsiteX12" fmla="*/ 203682 w 1463636"/>
+                        <a:gd name="connsiteY12" fmla="*/ 63237 h 1402712"/>
+                        <a:gd name="connsiteX0" fmla="*/ 203682 w 1464565"/>
+                        <a:gd name="connsiteY0" fmla="*/ 63237 h 1402712"/>
+                        <a:gd name="connsiteX1" fmla="*/ 883132 w 1464565"/>
+                        <a:gd name="connsiteY1" fmla="*/ 3547 h 1402712"/>
+                        <a:gd name="connsiteX2" fmla="*/ 1366367 w 1464565"/>
+                        <a:gd name="connsiteY2" fmla="*/ 155312 h 1402712"/>
+                        <a:gd name="connsiteX3" fmla="*/ 1459712 w 1464565"/>
+                        <a:gd name="connsiteY3" fmla="*/ 376927 h 1402712"/>
+                        <a:gd name="connsiteX4" fmla="*/ 1448282 w 1464565"/>
+                        <a:gd name="connsiteY4" fmla="*/ 991607 h 1402712"/>
+                        <a:gd name="connsiteX5" fmla="*/ 1319377 w 1464565"/>
+                        <a:gd name="connsiteY5" fmla="*/ 1231002 h 1402712"/>
+                        <a:gd name="connsiteX6" fmla="*/ 605002 w 1464565"/>
+                        <a:gd name="connsiteY6" fmla="*/ 1391657 h 1402712"/>
+                        <a:gd name="connsiteX7" fmla="*/ 450062 w 1464565"/>
+                        <a:gd name="connsiteY7" fmla="*/ 1373877 h 1402712"/>
+                        <a:gd name="connsiteX8" fmla="*/ 259562 w 1464565"/>
+                        <a:gd name="connsiteY8" fmla="*/ 1254497 h 1402712"/>
+                        <a:gd name="connsiteX9" fmla="*/ 79222 w 1464565"/>
+                        <a:gd name="connsiteY9" fmla="*/ 1097017 h 1402712"/>
+                        <a:gd name="connsiteX10" fmla="*/ 43662 w 1464565"/>
+                        <a:gd name="connsiteY10" fmla="*/ 1033517 h 1402712"/>
+                        <a:gd name="connsiteX11" fmla="*/ 10642 w 1464565"/>
+                        <a:gd name="connsiteY11" fmla="*/ 230877 h 1402712"/>
+                        <a:gd name="connsiteX12" fmla="*/ 203682 w 1464565"/>
+                        <a:gd name="connsiteY12" fmla="*/ 63237 h 1402712"/>
+                        <a:gd name="connsiteX0" fmla="*/ 203682 w 1464565"/>
+                        <a:gd name="connsiteY0" fmla="*/ 63237 h 1391778"/>
+                        <a:gd name="connsiteX1" fmla="*/ 883132 w 1464565"/>
+                        <a:gd name="connsiteY1" fmla="*/ 3547 h 1391778"/>
+                        <a:gd name="connsiteX2" fmla="*/ 1366367 w 1464565"/>
+                        <a:gd name="connsiteY2" fmla="*/ 155312 h 1391778"/>
+                        <a:gd name="connsiteX3" fmla="*/ 1459712 w 1464565"/>
+                        <a:gd name="connsiteY3" fmla="*/ 376927 h 1391778"/>
+                        <a:gd name="connsiteX4" fmla="*/ 1448282 w 1464565"/>
+                        <a:gd name="connsiteY4" fmla="*/ 991607 h 1391778"/>
+                        <a:gd name="connsiteX5" fmla="*/ 1319377 w 1464565"/>
+                        <a:gd name="connsiteY5" fmla="*/ 1231002 h 1391778"/>
+                        <a:gd name="connsiteX6" fmla="*/ 605002 w 1464565"/>
+                        <a:gd name="connsiteY6" fmla="*/ 1391657 h 1391778"/>
+                        <a:gd name="connsiteX7" fmla="*/ 259562 w 1464565"/>
+                        <a:gd name="connsiteY7" fmla="*/ 1254497 h 1391778"/>
+                        <a:gd name="connsiteX8" fmla="*/ 79222 w 1464565"/>
+                        <a:gd name="connsiteY8" fmla="*/ 1097017 h 1391778"/>
+                        <a:gd name="connsiteX9" fmla="*/ 43662 w 1464565"/>
+                        <a:gd name="connsiteY9" fmla="*/ 1033517 h 1391778"/>
+                        <a:gd name="connsiteX10" fmla="*/ 10642 w 1464565"/>
+                        <a:gd name="connsiteY10" fmla="*/ 230877 h 1391778"/>
+                        <a:gd name="connsiteX11" fmla="*/ 203682 w 1464565"/>
+                        <a:gd name="connsiteY11" fmla="*/ 63237 h 1391778"/>
+                        <a:gd name="connsiteX0" fmla="*/ 203682 w 1464565"/>
+                        <a:gd name="connsiteY0" fmla="*/ 63237 h 1394453"/>
+                        <a:gd name="connsiteX1" fmla="*/ 883132 w 1464565"/>
+                        <a:gd name="connsiteY1" fmla="*/ 3547 h 1394453"/>
+                        <a:gd name="connsiteX2" fmla="*/ 1366367 w 1464565"/>
+                        <a:gd name="connsiteY2" fmla="*/ 155312 h 1394453"/>
+                        <a:gd name="connsiteX3" fmla="*/ 1459712 w 1464565"/>
+                        <a:gd name="connsiteY3" fmla="*/ 376927 h 1394453"/>
+                        <a:gd name="connsiteX4" fmla="*/ 1448282 w 1464565"/>
+                        <a:gd name="connsiteY4" fmla="*/ 991607 h 1394453"/>
+                        <a:gd name="connsiteX5" fmla="*/ 1319377 w 1464565"/>
+                        <a:gd name="connsiteY5" fmla="*/ 1231002 h 1394453"/>
+                        <a:gd name="connsiteX6" fmla="*/ 605002 w 1464565"/>
+                        <a:gd name="connsiteY6" fmla="*/ 1391657 h 1394453"/>
+                        <a:gd name="connsiteX7" fmla="*/ 320522 w 1464565"/>
+                        <a:gd name="connsiteY7" fmla="*/ 1315457 h 1394453"/>
+                        <a:gd name="connsiteX8" fmla="*/ 79222 w 1464565"/>
+                        <a:gd name="connsiteY8" fmla="*/ 1097017 h 1394453"/>
+                        <a:gd name="connsiteX9" fmla="*/ 43662 w 1464565"/>
+                        <a:gd name="connsiteY9" fmla="*/ 1033517 h 1394453"/>
+                        <a:gd name="connsiteX10" fmla="*/ 10642 w 1464565"/>
+                        <a:gd name="connsiteY10" fmla="*/ 230877 h 1394453"/>
+                        <a:gd name="connsiteX11" fmla="*/ 203682 w 1464565"/>
+                        <a:gd name="connsiteY11" fmla="*/ 63237 h 1394453"/>
+                        <a:gd name="connsiteX0" fmla="*/ 203682 w 1464565"/>
+                        <a:gd name="connsiteY0" fmla="*/ 63237 h 1388999"/>
+                        <a:gd name="connsiteX1" fmla="*/ 883132 w 1464565"/>
+                        <a:gd name="connsiteY1" fmla="*/ 3547 h 1388999"/>
+                        <a:gd name="connsiteX2" fmla="*/ 1366367 w 1464565"/>
+                        <a:gd name="connsiteY2" fmla="*/ 155312 h 1388999"/>
+                        <a:gd name="connsiteX3" fmla="*/ 1459712 w 1464565"/>
+                        <a:gd name="connsiteY3" fmla="*/ 376927 h 1388999"/>
+                        <a:gd name="connsiteX4" fmla="*/ 1448282 w 1464565"/>
+                        <a:gd name="connsiteY4" fmla="*/ 991607 h 1388999"/>
+                        <a:gd name="connsiteX5" fmla="*/ 1319377 w 1464565"/>
+                        <a:gd name="connsiteY5" fmla="*/ 1231002 h 1388999"/>
+                        <a:gd name="connsiteX6" fmla="*/ 612622 w 1464565"/>
+                        <a:gd name="connsiteY6" fmla="*/ 1385942 h 1388999"/>
+                        <a:gd name="connsiteX7" fmla="*/ 320522 w 1464565"/>
+                        <a:gd name="connsiteY7" fmla="*/ 1315457 h 1388999"/>
+                        <a:gd name="connsiteX8" fmla="*/ 79222 w 1464565"/>
+                        <a:gd name="connsiteY8" fmla="*/ 1097017 h 1388999"/>
+                        <a:gd name="connsiteX9" fmla="*/ 43662 w 1464565"/>
+                        <a:gd name="connsiteY9" fmla="*/ 1033517 h 1388999"/>
+                        <a:gd name="connsiteX10" fmla="*/ 10642 w 1464565"/>
+                        <a:gd name="connsiteY10" fmla="*/ 230877 h 1388999"/>
+                        <a:gd name="connsiteX11" fmla="*/ 203682 w 1464565"/>
+                        <a:gd name="connsiteY11" fmla="*/ 63237 h 1388999"/>
+                        <a:gd name="connsiteX0" fmla="*/ 203682 w 1464565"/>
+                        <a:gd name="connsiteY0" fmla="*/ 63237 h 1391628"/>
+                        <a:gd name="connsiteX1" fmla="*/ 883132 w 1464565"/>
+                        <a:gd name="connsiteY1" fmla="*/ 3547 h 1391628"/>
+                        <a:gd name="connsiteX2" fmla="*/ 1366367 w 1464565"/>
+                        <a:gd name="connsiteY2" fmla="*/ 155312 h 1391628"/>
+                        <a:gd name="connsiteX3" fmla="*/ 1459712 w 1464565"/>
+                        <a:gd name="connsiteY3" fmla="*/ 376927 h 1391628"/>
+                        <a:gd name="connsiteX4" fmla="*/ 1448282 w 1464565"/>
+                        <a:gd name="connsiteY4" fmla="*/ 991607 h 1391628"/>
+                        <a:gd name="connsiteX5" fmla="*/ 1319377 w 1464565"/>
+                        <a:gd name="connsiteY5" fmla="*/ 1231002 h 1391628"/>
+                        <a:gd name="connsiteX6" fmla="*/ 612622 w 1464565"/>
+                        <a:gd name="connsiteY6" fmla="*/ 1385942 h 1391628"/>
+                        <a:gd name="connsiteX7" fmla="*/ 320522 w 1464565"/>
+                        <a:gd name="connsiteY7" fmla="*/ 1315457 h 1391628"/>
+                        <a:gd name="connsiteX8" fmla="*/ 79222 w 1464565"/>
+                        <a:gd name="connsiteY8" fmla="*/ 1097017 h 1391628"/>
+                        <a:gd name="connsiteX9" fmla="*/ 43662 w 1464565"/>
+                        <a:gd name="connsiteY9" fmla="*/ 1033517 h 1391628"/>
+                        <a:gd name="connsiteX10" fmla="*/ 10642 w 1464565"/>
+                        <a:gd name="connsiteY10" fmla="*/ 230877 h 1391628"/>
+                        <a:gd name="connsiteX11" fmla="*/ 203682 w 1464565"/>
+                        <a:gd name="connsiteY11" fmla="*/ 63237 h 1391628"/>
+                        <a:gd name="connsiteX0" fmla="*/ 203682 w 1468615"/>
+                        <a:gd name="connsiteY0" fmla="*/ 63237 h 1388113"/>
+                        <a:gd name="connsiteX1" fmla="*/ 883132 w 1468615"/>
+                        <a:gd name="connsiteY1" fmla="*/ 3547 h 1388113"/>
+                        <a:gd name="connsiteX2" fmla="*/ 1366367 w 1468615"/>
+                        <a:gd name="connsiteY2" fmla="*/ 155312 h 1388113"/>
+                        <a:gd name="connsiteX3" fmla="*/ 1459712 w 1468615"/>
+                        <a:gd name="connsiteY3" fmla="*/ 376927 h 1388113"/>
+                        <a:gd name="connsiteX4" fmla="*/ 1448282 w 1468615"/>
+                        <a:gd name="connsiteY4" fmla="*/ 991607 h 1388113"/>
+                        <a:gd name="connsiteX5" fmla="*/ 1313662 w 1468615"/>
+                        <a:gd name="connsiteY5" fmla="*/ 1248147 h 1388113"/>
+                        <a:gd name="connsiteX6" fmla="*/ 612622 w 1468615"/>
+                        <a:gd name="connsiteY6" fmla="*/ 1385942 h 1388113"/>
+                        <a:gd name="connsiteX7" fmla="*/ 320522 w 1468615"/>
+                        <a:gd name="connsiteY7" fmla="*/ 1315457 h 1388113"/>
+                        <a:gd name="connsiteX8" fmla="*/ 79222 w 1468615"/>
+                        <a:gd name="connsiteY8" fmla="*/ 1097017 h 1388113"/>
+                        <a:gd name="connsiteX9" fmla="*/ 43662 w 1468615"/>
+                        <a:gd name="connsiteY9" fmla="*/ 1033517 h 1388113"/>
+                        <a:gd name="connsiteX10" fmla="*/ 10642 w 1468615"/>
+                        <a:gd name="connsiteY10" fmla="*/ 230877 h 1388113"/>
+                        <a:gd name="connsiteX11" fmla="*/ 203682 w 1468615"/>
+                        <a:gd name="connsiteY11" fmla="*/ 63237 h 1388113"/>
+                        <a:gd name="connsiteX0" fmla="*/ 203682 w 1466109"/>
+                        <a:gd name="connsiteY0" fmla="*/ 63237 h 1388113"/>
+                        <a:gd name="connsiteX1" fmla="*/ 883132 w 1466109"/>
+                        <a:gd name="connsiteY1" fmla="*/ 3547 h 1388113"/>
+                        <a:gd name="connsiteX2" fmla="*/ 1366367 w 1466109"/>
+                        <a:gd name="connsiteY2" fmla="*/ 155312 h 1388113"/>
+                        <a:gd name="connsiteX3" fmla="*/ 1459712 w 1466109"/>
+                        <a:gd name="connsiteY3" fmla="*/ 376927 h 1388113"/>
+                        <a:gd name="connsiteX4" fmla="*/ 1448282 w 1466109"/>
+                        <a:gd name="connsiteY4" fmla="*/ 991607 h 1388113"/>
+                        <a:gd name="connsiteX5" fmla="*/ 1313662 w 1466109"/>
+                        <a:gd name="connsiteY5" fmla="*/ 1248147 h 1388113"/>
+                        <a:gd name="connsiteX6" fmla="*/ 612622 w 1466109"/>
+                        <a:gd name="connsiteY6" fmla="*/ 1385942 h 1388113"/>
+                        <a:gd name="connsiteX7" fmla="*/ 320522 w 1466109"/>
+                        <a:gd name="connsiteY7" fmla="*/ 1315457 h 1388113"/>
+                        <a:gd name="connsiteX8" fmla="*/ 79222 w 1466109"/>
+                        <a:gd name="connsiteY8" fmla="*/ 1097017 h 1388113"/>
+                        <a:gd name="connsiteX9" fmla="*/ 43662 w 1466109"/>
+                        <a:gd name="connsiteY9" fmla="*/ 1033517 h 1388113"/>
+                        <a:gd name="connsiteX10" fmla="*/ 10642 w 1466109"/>
+                        <a:gd name="connsiteY10" fmla="*/ 230877 h 1388113"/>
+                        <a:gd name="connsiteX11" fmla="*/ 203682 w 1466109"/>
+                        <a:gd name="connsiteY11" fmla="*/ 63237 h 1388113"/>
+                        <a:gd name="connsiteX0" fmla="*/ 203682 w 1463570"/>
+                        <a:gd name="connsiteY0" fmla="*/ 63237 h 1388113"/>
+                        <a:gd name="connsiteX1" fmla="*/ 883132 w 1463570"/>
+                        <a:gd name="connsiteY1" fmla="*/ 3547 h 1388113"/>
+                        <a:gd name="connsiteX2" fmla="*/ 1366367 w 1463570"/>
+                        <a:gd name="connsiteY2" fmla="*/ 155312 h 1388113"/>
+                        <a:gd name="connsiteX3" fmla="*/ 1459712 w 1463570"/>
+                        <a:gd name="connsiteY3" fmla="*/ 376927 h 1388113"/>
+                        <a:gd name="connsiteX4" fmla="*/ 1448282 w 1463570"/>
+                        <a:gd name="connsiteY4" fmla="*/ 991607 h 1388113"/>
+                        <a:gd name="connsiteX5" fmla="*/ 1313662 w 1463570"/>
+                        <a:gd name="connsiteY5" fmla="*/ 1248147 h 1388113"/>
+                        <a:gd name="connsiteX6" fmla="*/ 612622 w 1463570"/>
+                        <a:gd name="connsiteY6" fmla="*/ 1385942 h 1388113"/>
+                        <a:gd name="connsiteX7" fmla="*/ 320522 w 1463570"/>
+                        <a:gd name="connsiteY7" fmla="*/ 1315457 h 1388113"/>
+                        <a:gd name="connsiteX8" fmla="*/ 79222 w 1463570"/>
+                        <a:gd name="connsiteY8" fmla="*/ 1097017 h 1388113"/>
+                        <a:gd name="connsiteX9" fmla="*/ 43662 w 1463570"/>
+                        <a:gd name="connsiteY9" fmla="*/ 1033517 h 1388113"/>
+                        <a:gd name="connsiteX10" fmla="*/ 10642 w 1463570"/>
+                        <a:gd name="connsiteY10" fmla="*/ 230877 h 1388113"/>
+                        <a:gd name="connsiteX11" fmla="*/ 203682 w 1463570"/>
+                        <a:gd name="connsiteY11" fmla="*/ 63237 h 1388113"/>
+                        <a:gd name="connsiteX0" fmla="*/ 203342 w 1463230"/>
+                        <a:gd name="connsiteY0" fmla="*/ 63237 h 1388113"/>
+                        <a:gd name="connsiteX1" fmla="*/ 882792 w 1463230"/>
+                        <a:gd name="connsiteY1" fmla="*/ 3547 h 1388113"/>
+                        <a:gd name="connsiteX2" fmla="*/ 1366027 w 1463230"/>
+                        <a:gd name="connsiteY2" fmla="*/ 155312 h 1388113"/>
+                        <a:gd name="connsiteX3" fmla="*/ 1459372 w 1463230"/>
+                        <a:gd name="connsiteY3" fmla="*/ 376927 h 1388113"/>
+                        <a:gd name="connsiteX4" fmla="*/ 1447942 w 1463230"/>
+                        <a:gd name="connsiteY4" fmla="*/ 991607 h 1388113"/>
+                        <a:gd name="connsiteX5" fmla="*/ 1313322 w 1463230"/>
+                        <a:gd name="connsiteY5" fmla="*/ 1248147 h 1388113"/>
+                        <a:gd name="connsiteX6" fmla="*/ 612282 w 1463230"/>
+                        <a:gd name="connsiteY6" fmla="*/ 1385942 h 1388113"/>
+                        <a:gd name="connsiteX7" fmla="*/ 320182 w 1463230"/>
+                        <a:gd name="connsiteY7" fmla="*/ 1315457 h 1388113"/>
+                        <a:gd name="connsiteX8" fmla="*/ 78882 w 1463230"/>
+                        <a:gd name="connsiteY8" fmla="*/ 1097017 h 1388113"/>
+                        <a:gd name="connsiteX9" fmla="*/ 31892 w 1463230"/>
+                        <a:gd name="connsiteY9" fmla="*/ 860162 h 1388113"/>
+                        <a:gd name="connsiteX10" fmla="*/ 10302 w 1463230"/>
+                        <a:gd name="connsiteY10" fmla="*/ 230877 h 1388113"/>
+                        <a:gd name="connsiteX11" fmla="*/ 203342 w 1463230"/>
+                        <a:gd name="connsiteY11" fmla="*/ 63237 h 1388113"/>
+                        <a:gd name="connsiteX0" fmla="*/ 203342 w 1463230"/>
+                        <a:gd name="connsiteY0" fmla="*/ 63237 h 1387917"/>
+                        <a:gd name="connsiteX1" fmla="*/ 882792 w 1463230"/>
+                        <a:gd name="connsiteY1" fmla="*/ 3547 h 1387917"/>
+                        <a:gd name="connsiteX2" fmla="*/ 1366027 w 1463230"/>
+                        <a:gd name="connsiteY2" fmla="*/ 155312 h 1387917"/>
+                        <a:gd name="connsiteX3" fmla="*/ 1459372 w 1463230"/>
+                        <a:gd name="connsiteY3" fmla="*/ 376927 h 1387917"/>
+                        <a:gd name="connsiteX4" fmla="*/ 1447942 w 1463230"/>
+                        <a:gd name="connsiteY4" fmla="*/ 991607 h 1387917"/>
+                        <a:gd name="connsiteX5" fmla="*/ 1313322 w 1463230"/>
+                        <a:gd name="connsiteY5" fmla="*/ 1248147 h 1387917"/>
+                        <a:gd name="connsiteX6" fmla="*/ 612282 w 1463230"/>
+                        <a:gd name="connsiteY6" fmla="*/ 1385942 h 1387917"/>
+                        <a:gd name="connsiteX7" fmla="*/ 320182 w 1463230"/>
+                        <a:gd name="connsiteY7" fmla="*/ 1315457 h 1387917"/>
+                        <a:gd name="connsiteX8" fmla="*/ 99837 w 1463230"/>
+                        <a:gd name="connsiteY8" fmla="*/ 1125592 h 1387917"/>
+                        <a:gd name="connsiteX9" fmla="*/ 31892 w 1463230"/>
+                        <a:gd name="connsiteY9" fmla="*/ 860162 h 1387917"/>
+                        <a:gd name="connsiteX10" fmla="*/ 10302 w 1463230"/>
+                        <a:gd name="connsiteY10" fmla="*/ 230877 h 1387917"/>
+                        <a:gd name="connsiteX11" fmla="*/ 203342 w 1463230"/>
+                        <a:gd name="connsiteY11" fmla="*/ 63237 h 1387917"/>
+                        <a:gd name="connsiteX0" fmla="*/ 203342 w 1463230"/>
+                        <a:gd name="connsiteY0" fmla="*/ 63237 h 1387917"/>
+                        <a:gd name="connsiteX1" fmla="*/ 882792 w 1463230"/>
+                        <a:gd name="connsiteY1" fmla="*/ 3547 h 1387917"/>
+                        <a:gd name="connsiteX2" fmla="*/ 1366027 w 1463230"/>
+                        <a:gd name="connsiteY2" fmla="*/ 155312 h 1387917"/>
+                        <a:gd name="connsiteX3" fmla="*/ 1459372 w 1463230"/>
+                        <a:gd name="connsiteY3" fmla="*/ 376927 h 1387917"/>
+                        <a:gd name="connsiteX4" fmla="*/ 1447942 w 1463230"/>
+                        <a:gd name="connsiteY4" fmla="*/ 991607 h 1387917"/>
+                        <a:gd name="connsiteX5" fmla="*/ 1313322 w 1463230"/>
+                        <a:gd name="connsiteY5" fmla="*/ 1248147 h 1387917"/>
+                        <a:gd name="connsiteX6" fmla="*/ 612282 w 1463230"/>
+                        <a:gd name="connsiteY6" fmla="*/ 1385942 h 1387917"/>
+                        <a:gd name="connsiteX7" fmla="*/ 320182 w 1463230"/>
+                        <a:gd name="connsiteY7" fmla="*/ 1315457 h 1387917"/>
+                        <a:gd name="connsiteX8" fmla="*/ 99837 w 1463230"/>
+                        <a:gd name="connsiteY8" fmla="*/ 1125592 h 1387917"/>
+                        <a:gd name="connsiteX9" fmla="*/ 31892 w 1463230"/>
+                        <a:gd name="connsiteY9" fmla="*/ 860162 h 1387917"/>
+                        <a:gd name="connsiteX10" fmla="*/ 10302 w 1463230"/>
+                        <a:gd name="connsiteY10" fmla="*/ 230877 h 1387917"/>
+                        <a:gd name="connsiteX11" fmla="*/ 203342 w 1463230"/>
+                        <a:gd name="connsiteY11" fmla="*/ 63237 h 1387917"/>
+                        <a:gd name="connsiteX0" fmla="*/ 203342 w 1463230"/>
+                        <a:gd name="connsiteY0" fmla="*/ 63237 h 1388268"/>
+                        <a:gd name="connsiteX1" fmla="*/ 882792 w 1463230"/>
+                        <a:gd name="connsiteY1" fmla="*/ 3547 h 1388268"/>
+                        <a:gd name="connsiteX2" fmla="*/ 1366027 w 1463230"/>
+                        <a:gd name="connsiteY2" fmla="*/ 155312 h 1388268"/>
+                        <a:gd name="connsiteX3" fmla="*/ 1459372 w 1463230"/>
+                        <a:gd name="connsiteY3" fmla="*/ 376927 h 1388268"/>
+                        <a:gd name="connsiteX4" fmla="*/ 1447942 w 1463230"/>
+                        <a:gd name="connsiteY4" fmla="*/ 991607 h 1388268"/>
+                        <a:gd name="connsiteX5" fmla="*/ 1313322 w 1463230"/>
+                        <a:gd name="connsiteY5" fmla="*/ 1248147 h 1388268"/>
+                        <a:gd name="connsiteX6" fmla="*/ 612282 w 1463230"/>
+                        <a:gd name="connsiteY6" fmla="*/ 1385942 h 1388268"/>
+                        <a:gd name="connsiteX7" fmla="*/ 329707 w 1463230"/>
+                        <a:gd name="connsiteY7" fmla="*/ 1319267 h 1388268"/>
+                        <a:gd name="connsiteX8" fmla="*/ 99837 w 1463230"/>
+                        <a:gd name="connsiteY8" fmla="*/ 1125592 h 1388268"/>
+                        <a:gd name="connsiteX9" fmla="*/ 31892 w 1463230"/>
+                        <a:gd name="connsiteY9" fmla="*/ 860162 h 1388268"/>
+                        <a:gd name="connsiteX10" fmla="*/ 10302 w 1463230"/>
+                        <a:gd name="connsiteY10" fmla="*/ 230877 h 1388268"/>
+                        <a:gd name="connsiteX11" fmla="*/ 203342 w 1463230"/>
+                        <a:gd name="connsiteY11" fmla="*/ 63237 h 1388268"/>
+                        <a:gd name="connsiteX0" fmla="*/ 203342 w 1463230"/>
+                        <a:gd name="connsiteY0" fmla="*/ 63237 h 1388562"/>
+                        <a:gd name="connsiteX1" fmla="*/ 882792 w 1463230"/>
+                        <a:gd name="connsiteY1" fmla="*/ 3547 h 1388562"/>
+                        <a:gd name="connsiteX2" fmla="*/ 1366027 w 1463230"/>
+                        <a:gd name="connsiteY2" fmla="*/ 155312 h 1388562"/>
+                        <a:gd name="connsiteX3" fmla="*/ 1459372 w 1463230"/>
+                        <a:gd name="connsiteY3" fmla="*/ 376927 h 1388562"/>
+                        <a:gd name="connsiteX4" fmla="*/ 1447942 w 1463230"/>
+                        <a:gd name="connsiteY4" fmla="*/ 991607 h 1388562"/>
+                        <a:gd name="connsiteX5" fmla="*/ 1313322 w 1463230"/>
+                        <a:gd name="connsiteY5" fmla="*/ 1248147 h 1388562"/>
+                        <a:gd name="connsiteX6" fmla="*/ 612282 w 1463230"/>
+                        <a:gd name="connsiteY6" fmla="*/ 1385942 h 1388562"/>
+                        <a:gd name="connsiteX7" fmla="*/ 329707 w 1463230"/>
+                        <a:gd name="connsiteY7" fmla="*/ 1319267 h 1388562"/>
+                        <a:gd name="connsiteX8" fmla="*/ 99837 w 1463230"/>
+                        <a:gd name="connsiteY8" fmla="*/ 1125592 h 1388562"/>
+                        <a:gd name="connsiteX9" fmla="*/ 31892 w 1463230"/>
+                        <a:gd name="connsiteY9" fmla="*/ 860162 h 1388562"/>
+                        <a:gd name="connsiteX10" fmla="*/ 10302 w 1463230"/>
+                        <a:gd name="connsiteY10" fmla="*/ 230877 h 1388562"/>
+                        <a:gd name="connsiteX11" fmla="*/ 203342 w 1463230"/>
+                        <a:gd name="connsiteY11" fmla="*/ 63237 h 1388562"/>
+                        <a:gd name="connsiteX0" fmla="*/ 203342 w 1463230"/>
+                        <a:gd name="connsiteY0" fmla="*/ 63237 h 1391939"/>
+                        <a:gd name="connsiteX1" fmla="*/ 882792 w 1463230"/>
+                        <a:gd name="connsiteY1" fmla="*/ 3547 h 1391939"/>
+                        <a:gd name="connsiteX2" fmla="*/ 1366027 w 1463230"/>
+                        <a:gd name="connsiteY2" fmla="*/ 155312 h 1391939"/>
+                        <a:gd name="connsiteX3" fmla="*/ 1459372 w 1463230"/>
+                        <a:gd name="connsiteY3" fmla="*/ 376927 h 1391939"/>
+                        <a:gd name="connsiteX4" fmla="*/ 1447942 w 1463230"/>
+                        <a:gd name="connsiteY4" fmla="*/ 991607 h 1391939"/>
+                        <a:gd name="connsiteX5" fmla="*/ 1313322 w 1463230"/>
+                        <a:gd name="connsiteY5" fmla="*/ 1248147 h 1391939"/>
+                        <a:gd name="connsiteX6" fmla="*/ 612282 w 1463230"/>
+                        <a:gd name="connsiteY6" fmla="*/ 1385942 h 1391939"/>
+                        <a:gd name="connsiteX7" fmla="*/ 329707 w 1463230"/>
+                        <a:gd name="connsiteY7" fmla="*/ 1319267 h 1391939"/>
+                        <a:gd name="connsiteX8" fmla="*/ 99837 w 1463230"/>
+                        <a:gd name="connsiteY8" fmla="*/ 1125592 h 1391939"/>
+                        <a:gd name="connsiteX9" fmla="*/ 31892 w 1463230"/>
+                        <a:gd name="connsiteY9" fmla="*/ 860162 h 1391939"/>
+                        <a:gd name="connsiteX10" fmla="*/ 10302 w 1463230"/>
+                        <a:gd name="connsiteY10" fmla="*/ 230877 h 1391939"/>
+                        <a:gd name="connsiteX11" fmla="*/ 203342 w 1463230"/>
+                        <a:gd name="connsiteY11" fmla="*/ 63237 h 1391939"/>
+                        <a:gd name="connsiteX0" fmla="*/ 203342 w 1463230"/>
+                        <a:gd name="connsiteY0" fmla="*/ 63237 h 1391939"/>
+                        <a:gd name="connsiteX1" fmla="*/ 882792 w 1463230"/>
+                        <a:gd name="connsiteY1" fmla="*/ 3547 h 1391939"/>
+                        <a:gd name="connsiteX2" fmla="*/ 1366027 w 1463230"/>
+                        <a:gd name="connsiteY2" fmla="*/ 155312 h 1391939"/>
+                        <a:gd name="connsiteX3" fmla="*/ 1459372 w 1463230"/>
+                        <a:gd name="connsiteY3" fmla="*/ 376927 h 1391939"/>
+                        <a:gd name="connsiteX4" fmla="*/ 1447942 w 1463230"/>
+                        <a:gd name="connsiteY4" fmla="*/ 991607 h 1391939"/>
+                        <a:gd name="connsiteX5" fmla="*/ 1313322 w 1463230"/>
+                        <a:gd name="connsiteY5" fmla="*/ 1248147 h 1391939"/>
+                        <a:gd name="connsiteX6" fmla="*/ 612282 w 1463230"/>
+                        <a:gd name="connsiteY6" fmla="*/ 1385942 h 1391939"/>
+                        <a:gd name="connsiteX7" fmla="*/ 329707 w 1463230"/>
+                        <a:gd name="connsiteY7" fmla="*/ 1319267 h 1391939"/>
+                        <a:gd name="connsiteX8" fmla="*/ 99837 w 1463230"/>
+                        <a:gd name="connsiteY8" fmla="*/ 1125592 h 1391939"/>
+                        <a:gd name="connsiteX9" fmla="*/ 31892 w 1463230"/>
+                        <a:gd name="connsiteY9" fmla="*/ 860162 h 1391939"/>
+                        <a:gd name="connsiteX10" fmla="*/ 10302 w 1463230"/>
+                        <a:gd name="connsiteY10" fmla="*/ 230877 h 1391939"/>
+                        <a:gd name="connsiteX11" fmla="*/ 203342 w 1463230"/>
+                        <a:gd name="connsiteY11" fmla="*/ 63237 h 1391939"/>
+                        <a:gd name="connsiteX0" fmla="*/ 205344 w 1465232"/>
+                        <a:gd name="connsiteY0" fmla="*/ 63237 h 1391939"/>
+                        <a:gd name="connsiteX1" fmla="*/ 884794 w 1465232"/>
+                        <a:gd name="connsiteY1" fmla="*/ 3547 h 1391939"/>
+                        <a:gd name="connsiteX2" fmla="*/ 1368029 w 1465232"/>
+                        <a:gd name="connsiteY2" fmla="*/ 155312 h 1391939"/>
+                        <a:gd name="connsiteX3" fmla="*/ 1461374 w 1465232"/>
+                        <a:gd name="connsiteY3" fmla="*/ 376927 h 1391939"/>
+                        <a:gd name="connsiteX4" fmla="*/ 1449944 w 1465232"/>
+                        <a:gd name="connsiteY4" fmla="*/ 991607 h 1391939"/>
+                        <a:gd name="connsiteX5" fmla="*/ 1315324 w 1465232"/>
+                        <a:gd name="connsiteY5" fmla="*/ 1248147 h 1391939"/>
+                        <a:gd name="connsiteX6" fmla="*/ 614284 w 1465232"/>
+                        <a:gd name="connsiteY6" fmla="*/ 1385942 h 1391939"/>
+                        <a:gd name="connsiteX7" fmla="*/ 331709 w 1465232"/>
+                        <a:gd name="connsiteY7" fmla="*/ 1319267 h 1391939"/>
+                        <a:gd name="connsiteX8" fmla="*/ 101839 w 1465232"/>
+                        <a:gd name="connsiteY8" fmla="*/ 1125592 h 1391939"/>
+                        <a:gd name="connsiteX9" fmla="*/ 26274 w 1465232"/>
+                        <a:gd name="connsiteY9" fmla="*/ 860162 h 1391939"/>
+                        <a:gd name="connsiteX10" fmla="*/ 12304 w 1465232"/>
+                        <a:gd name="connsiteY10" fmla="*/ 230877 h 1391939"/>
+                        <a:gd name="connsiteX11" fmla="*/ 205344 w 1465232"/>
+                        <a:gd name="connsiteY11" fmla="*/ 63237 h 1391939"/>
+                        <a:gd name="connsiteX0" fmla="*/ 204026 w 1463914"/>
+                        <a:gd name="connsiteY0" fmla="*/ 63237 h 1391939"/>
+                        <a:gd name="connsiteX1" fmla="*/ 883476 w 1463914"/>
+                        <a:gd name="connsiteY1" fmla="*/ 3547 h 1391939"/>
+                        <a:gd name="connsiteX2" fmla="*/ 1366711 w 1463914"/>
+                        <a:gd name="connsiteY2" fmla="*/ 155312 h 1391939"/>
+                        <a:gd name="connsiteX3" fmla="*/ 1460056 w 1463914"/>
+                        <a:gd name="connsiteY3" fmla="*/ 376927 h 1391939"/>
+                        <a:gd name="connsiteX4" fmla="*/ 1448626 w 1463914"/>
+                        <a:gd name="connsiteY4" fmla="*/ 991607 h 1391939"/>
+                        <a:gd name="connsiteX5" fmla="*/ 1314006 w 1463914"/>
+                        <a:gd name="connsiteY5" fmla="*/ 1248147 h 1391939"/>
+                        <a:gd name="connsiteX6" fmla="*/ 612966 w 1463914"/>
+                        <a:gd name="connsiteY6" fmla="*/ 1385942 h 1391939"/>
+                        <a:gd name="connsiteX7" fmla="*/ 330391 w 1463914"/>
+                        <a:gd name="connsiteY7" fmla="*/ 1319267 h 1391939"/>
+                        <a:gd name="connsiteX8" fmla="*/ 100521 w 1463914"/>
+                        <a:gd name="connsiteY8" fmla="*/ 1125592 h 1391939"/>
+                        <a:gd name="connsiteX9" fmla="*/ 24956 w 1463914"/>
+                        <a:gd name="connsiteY9" fmla="*/ 860162 h 1391939"/>
+                        <a:gd name="connsiteX10" fmla="*/ 10986 w 1463914"/>
+                        <a:gd name="connsiteY10" fmla="*/ 230877 h 1391939"/>
+                        <a:gd name="connsiteX11" fmla="*/ 204026 w 1463914"/>
+                        <a:gd name="connsiteY11" fmla="*/ 63237 h 1391939"/>
+                        <a:gd name="connsiteX0" fmla="*/ 204026 w 1463914"/>
+                        <a:gd name="connsiteY0" fmla="*/ 63237 h 1391939"/>
+                        <a:gd name="connsiteX1" fmla="*/ 883476 w 1463914"/>
+                        <a:gd name="connsiteY1" fmla="*/ 3547 h 1391939"/>
+                        <a:gd name="connsiteX2" fmla="*/ 1366711 w 1463914"/>
+                        <a:gd name="connsiteY2" fmla="*/ 155312 h 1391939"/>
+                        <a:gd name="connsiteX3" fmla="*/ 1460056 w 1463914"/>
+                        <a:gd name="connsiteY3" fmla="*/ 376927 h 1391939"/>
+                        <a:gd name="connsiteX4" fmla="*/ 1448626 w 1463914"/>
+                        <a:gd name="connsiteY4" fmla="*/ 991607 h 1391939"/>
+                        <a:gd name="connsiteX5" fmla="*/ 1314006 w 1463914"/>
+                        <a:gd name="connsiteY5" fmla="*/ 1248147 h 1391939"/>
+                        <a:gd name="connsiteX6" fmla="*/ 612966 w 1463914"/>
+                        <a:gd name="connsiteY6" fmla="*/ 1385942 h 1391939"/>
+                        <a:gd name="connsiteX7" fmla="*/ 330391 w 1463914"/>
+                        <a:gd name="connsiteY7" fmla="*/ 1319267 h 1391939"/>
+                        <a:gd name="connsiteX8" fmla="*/ 100521 w 1463914"/>
+                        <a:gd name="connsiteY8" fmla="*/ 1125592 h 1391939"/>
+                        <a:gd name="connsiteX9" fmla="*/ 24956 w 1463914"/>
+                        <a:gd name="connsiteY9" fmla="*/ 860162 h 1391939"/>
+                        <a:gd name="connsiteX10" fmla="*/ 10986 w 1463914"/>
+                        <a:gd name="connsiteY10" fmla="*/ 230877 h 1391939"/>
+                        <a:gd name="connsiteX11" fmla="*/ 204026 w 1463914"/>
+                        <a:gd name="connsiteY11" fmla="*/ 63237 h 1391939"/>
+                        <a:gd name="connsiteX0" fmla="*/ 206122 w 1466010"/>
+                        <a:gd name="connsiteY0" fmla="*/ 63237 h 1391939"/>
+                        <a:gd name="connsiteX1" fmla="*/ 885572 w 1466010"/>
+                        <a:gd name="connsiteY1" fmla="*/ 3547 h 1391939"/>
+                        <a:gd name="connsiteX2" fmla="*/ 1368807 w 1466010"/>
+                        <a:gd name="connsiteY2" fmla="*/ 155312 h 1391939"/>
+                        <a:gd name="connsiteX3" fmla="*/ 1462152 w 1466010"/>
+                        <a:gd name="connsiteY3" fmla="*/ 376927 h 1391939"/>
+                        <a:gd name="connsiteX4" fmla="*/ 1450722 w 1466010"/>
+                        <a:gd name="connsiteY4" fmla="*/ 991607 h 1391939"/>
+                        <a:gd name="connsiteX5" fmla="*/ 1316102 w 1466010"/>
+                        <a:gd name="connsiteY5" fmla="*/ 1248147 h 1391939"/>
+                        <a:gd name="connsiteX6" fmla="*/ 615062 w 1466010"/>
+                        <a:gd name="connsiteY6" fmla="*/ 1385942 h 1391939"/>
+                        <a:gd name="connsiteX7" fmla="*/ 332487 w 1466010"/>
+                        <a:gd name="connsiteY7" fmla="*/ 1319267 h 1391939"/>
+                        <a:gd name="connsiteX8" fmla="*/ 102617 w 1466010"/>
+                        <a:gd name="connsiteY8" fmla="*/ 1125592 h 1391939"/>
+                        <a:gd name="connsiteX9" fmla="*/ 19432 w 1466010"/>
+                        <a:gd name="connsiteY9" fmla="*/ 860162 h 1391939"/>
+                        <a:gd name="connsiteX10" fmla="*/ 13082 w 1466010"/>
+                        <a:gd name="connsiteY10" fmla="*/ 230877 h 1391939"/>
+                        <a:gd name="connsiteX11" fmla="*/ 206122 w 1466010"/>
+                        <a:gd name="connsiteY11" fmla="*/ 63237 h 1391939"/>
+                        <a:gd name="connsiteX0" fmla="*/ 204320 w 1464208"/>
+                        <a:gd name="connsiteY0" fmla="*/ 63237 h 1391939"/>
+                        <a:gd name="connsiteX1" fmla="*/ 883770 w 1464208"/>
+                        <a:gd name="connsiteY1" fmla="*/ 3547 h 1391939"/>
+                        <a:gd name="connsiteX2" fmla="*/ 1367005 w 1464208"/>
+                        <a:gd name="connsiteY2" fmla="*/ 155312 h 1391939"/>
+                        <a:gd name="connsiteX3" fmla="*/ 1460350 w 1464208"/>
+                        <a:gd name="connsiteY3" fmla="*/ 376927 h 1391939"/>
+                        <a:gd name="connsiteX4" fmla="*/ 1448920 w 1464208"/>
+                        <a:gd name="connsiteY4" fmla="*/ 991607 h 1391939"/>
+                        <a:gd name="connsiteX5" fmla="*/ 1314300 w 1464208"/>
+                        <a:gd name="connsiteY5" fmla="*/ 1248147 h 1391939"/>
+                        <a:gd name="connsiteX6" fmla="*/ 613260 w 1464208"/>
+                        <a:gd name="connsiteY6" fmla="*/ 1385942 h 1391939"/>
+                        <a:gd name="connsiteX7" fmla="*/ 330685 w 1464208"/>
+                        <a:gd name="connsiteY7" fmla="*/ 1319267 h 1391939"/>
+                        <a:gd name="connsiteX8" fmla="*/ 100815 w 1464208"/>
+                        <a:gd name="connsiteY8" fmla="*/ 1125592 h 1391939"/>
+                        <a:gd name="connsiteX9" fmla="*/ 17630 w 1464208"/>
+                        <a:gd name="connsiteY9" fmla="*/ 860162 h 1391939"/>
+                        <a:gd name="connsiteX10" fmla="*/ 11280 w 1464208"/>
+                        <a:gd name="connsiteY10" fmla="*/ 230877 h 1391939"/>
+                        <a:gd name="connsiteX11" fmla="*/ 204320 w 1464208"/>
+                        <a:gd name="connsiteY11" fmla="*/ 63237 h 1391939"/>
+                        <a:gd name="connsiteX0" fmla="*/ 198946 w 1458834"/>
+                        <a:gd name="connsiteY0" fmla="*/ 63237 h 1391939"/>
+                        <a:gd name="connsiteX1" fmla="*/ 878396 w 1458834"/>
+                        <a:gd name="connsiteY1" fmla="*/ 3547 h 1391939"/>
+                        <a:gd name="connsiteX2" fmla="*/ 1361631 w 1458834"/>
+                        <a:gd name="connsiteY2" fmla="*/ 155312 h 1391939"/>
+                        <a:gd name="connsiteX3" fmla="*/ 1454976 w 1458834"/>
+                        <a:gd name="connsiteY3" fmla="*/ 376927 h 1391939"/>
+                        <a:gd name="connsiteX4" fmla="*/ 1443546 w 1458834"/>
+                        <a:gd name="connsiteY4" fmla="*/ 991607 h 1391939"/>
+                        <a:gd name="connsiteX5" fmla="*/ 1308926 w 1458834"/>
+                        <a:gd name="connsiteY5" fmla="*/ 1248147 h 1391939"/>
+                        <a:gd name="connsiteX6" fmla="*/ 607886 w 1458834"/>
+                        <a:gd name="connsiteY6" fmla="*/ 1385942 h 1391939"/>
+                        <a:gd name="connsiteX7" fmla="*/ 325311 w 1458834"/>
+                        <a:gd name="connsiteY7" fmla="*/ 1319267 h 1391939"/>
+                        <a:gd name="connsiteX8" fmla="*/ 95441 w 1458834"/>
+                        <a:gd name="connsiteY8" fmla="*/ 1125592 h 1391939"/>
+                        <a:gd name="connsiteX9" fmla="*/ 12256 w 1458834"/>
+                        <a:gd name="connsiteY9" fmla="*/ 860162 h 1391939"/>
+                        <a:gd name="connsiteX10" fmla="*/ 5906 w 1458834"/>
+                        <a:gd name="connsiteY10" fmla="*/ 230877 h 1391939"/>
+                        <a:gd name="connsiteX11" fmla="*/ 198946 w 1458834"/>
+                        <a:gd name="connsiteY11" fmla="*/ 63237 h 1391939"/>
+                        <a:gd name="connsiteX0" fmla="*/ 198946 w 1458834"/>
+                        <a:gd name="connsiteY0" fmla="*/ 63237 h 1391939"/>
+                        <a:gd name="connsiteX1" fmla="*/ 878396 w 1458834"/>
+                        <a:gd name="connsiteY1" fmla="*/ 3547 h 1391939"/>
+                        <a:gd name="connsiteX2" fmla="*/ 1361631 w 1458834"/>
+                        <a:gd name="connsiteY2" fmla="*/ 155312 h 1391939"/>
+                        <a:gd name="connsiteX3" fmla="*/ 1454976 w 1458834"/>
+                        <a:gd name="connsiteY3" fmla="*/ 376927 h 1391939"/>
+                        <a:gd name="connsiteX4" fmla="*/ 1443546 w 1458834"/>
+                        <a:gd name="connsiteY4" fmla="*/ 991607 h 1391939"/>
+                        <a:gd name="connsiteX5" fmla="*/ 1308926 w 1458834"/>
+                        <a:gd name="connsiteY5" fmla="*/ 1248147 h 1391939"/>
+                        <a:gd name="connsiteX6" fmla="*/ 607886 w 1458834"/>
+                        <a:gd name="connsiteY6" fmla="*/ 1385942 h 1391939"/>
+                        <a:gd name="connsiteX7" fmla="*/ 325311 w 1458834"/>
+                        <a:gd name="connsiteY7" fmla="*/ 1319267 h 1391939"/>
+                        <a:gd name="connsiteX8" fmla="*/ 95441 w 1458834"/>
+                        <a:gd name="connsiteY8" fmla="*/ 1125592 h 1391939"/>
+                        <a:gd name="connsiteX9" fmla="*/ 12256 w 1458834"/>
+                        <a:gd name="connsiteY9" fmla="*/ 860162 h 1391939"/>
+                        <a:gd name="connsiteX10" fmla="*/ 5906 w 1458834"/>
+                        <a:gd name="connsiteY10" fmla="*/ 230877 h 1391939"/>
+                        <a:gd name="connsiteX11" fmla="*/ 198946 w 1458834"/>
+                        <a:gd name="connsiteY11" fmla="*/ 63237 h 1391939"/>
+                        <a:gd name="connsiteX0" fmla="*/ 198946 w 1458834"/>
+                        <a:gd name="connsiteY0" fmla="*/ 63237 h 1391939"/>
+                        <a:gd name="connsiteX1" fmla="*/ 878396 w 1458834"/>
+                        <a:gd name="connsiteY1" fmla="*/ 3547 h 1391939"/>
+                        <a:gd name="connsiteX2" fmla="*/ 1361631 w 1458834"/>
+                        <a:gd name="connsiteY2" fmla="*/ 155312 h 1391939"/>
+                        <a:gd name="connsiteX3" fmla="*/ 1454976 w 1458834"/>
+                        <a:gd name="connsiteY3" fmla="*/ 376927 h 1391939"/>
+                        <a:gd name="connsiteX4" fmla="*/ 1443546 w 1458834"/>
+                        <a:gd name="connsiteY4" fmla="*/ 991607 h 1391939"/>
+                        <a:gd name="connsiteX5" fmla="*/ 1308926 w 1458834"/>
+                        <a:gd name="connsiteY5" fmla="*/ 1248147 h 1391939"/>
+                        <a:gd name="connsiteX6" fmla="*/ 607886 w 1458834"/>
+                        <a:gd name="connsiteY6" fmla="*/ 1385942 h 1391939"/>
+                        <a:gd name="connsiteX7" fmla="*/ 325311 w 1458834"/>
+                        <a:gd name="connsiteY7" fmla="*/ 1319267 h 1391939"/>
+                        <a:gd name="connsiteX8" fmla="*/ 95441 w 1458834"/>
+                        <a:gd name="connsiteY8" fmla="*/ 1125592 h 1391939"/>
+                        <a:gd name="connsiteX9" fmla="*/ 12256 w 1458834"/>
+                        <a:gd name="connsiteY9" fmla="*/ 860162 h 1391939"/>
+                        <a:gd name="connsiteX10" fmla="*/ 5906 w 1458834"/>
+                        <a:gd name="connsiteY10" fmla="*/ 230877 h 1391939"/>
+                        <a:gd name="connsiteX11" fmla="*/ 198946 w 1458834"/>
+                        <a:gd name="connsiteY11" fmla="*/ 63237 h 1391939"/>
+                        <a:gd name="connsiteX0" fmla="*/ 198946 w 1458834"/>
+                        <a:gd name="connsiteY0" fmla="*/ 63237 h 1393281"/>
+                        <a:gd name="connsiteX1" fmla="*/ 878396 w 1458834"/>
+                        <a:gd name="connsiteY1" fmla="*/ 3547 h 1393281"/>
+                        <a:gd name="connsiteX2" fmla="*/ 1361631 w 1458834"/>
+                        <a:gd name="connsiteY2" fmla="*/ 155312 h 1393281"/>
+                        <a:gd name="connsiteX3" fmla="*/ 1454976 w 1458834"/>
+                        <a:gd name="connsiteY3" fmla="*/ 376927 h 1393281"/>
+                        <a:gd name="connsiteX4" fmla="*/ 1443546 w 1458834"/>
+                        <a:gd name="connsiteY4" fmla="*/ 991607 h 1393281"/>
+                        <a:gd name="connsiteX5" fmla="*/ 1308926 w 1458834"/>
+                        <a:gd name="connsiteY5" fmla="*/ 1248147 h 1393281"/>
+                        <a:gd name="connsiteX6" fmla="*/ 607886 w 1458834"/>
+                        <a:gd name="connsiteY6" fmla="*/ 1385942 h 1393281"/>
+                        <a:gd name="connsiteX7" fmla="*/ 325311 w 1458834"/>
+                        <a:gd name="connsiteY7" fmla="*/ 1319267 h 1393281"/>
+                        <a:gd name="connsiteX8" fmla="*/ 95441 w 1458834"/>
+                        <a:gd name="connsiteY8" fmla="*/ 1125592 h 1393281"/>
+                        <a:gd name="connsiteX9" fmla="*/ 12256 w 1458834"/>
+                        <a:gd name="connsiteY9" fmla="*/ 860162 h 1393281"/>
+                        <a:gd name="connsiteX10" fmla="*/ 5906 w 1458834"/>
+                        <a:gd name="connsiteY10" fmla="*/ 230877 h 1393281"/>
+                        <a:gd name="connsiteX11" fmla="*/ 198946 w 1458834"/>
+                        <a:gd name="connsiteY11" fmla="*/ 63237 h 1393281"/>
+                        <a:gd name="connsiteX0" fmla="*/ 207971 w 1467859"/>
+                        <a:gd name="connsiteY0" fmla="*/ 63853 h 1393897"/>
+                        <a:gd name="connsiteX1" fmla="*/ 887421 w 1467859"/>
+                        <a:gd name="connsiteY1" fmla="*/ 4163 h 1393897"/>
+                        <a:gd name="connsiteX2" fmla="*/ 1370656 w 1467859"/>
+                        <a:gd name="connsiteY2" fmla="*/ 155928 h 1393897"/>
+                        <a:gd name="connsiteX3" fmla="*/ 1464001 w 1467859"/>
+                        <a:gd name="connsiteY3" fmla="*/ 377543 h 1393897"/>
+                        <a:gd name="connsiteX4" fmla="*/ 1452571 w 1467859"/>
+                        <a:gd name="connsiteY4" fmla="*/ 992223 h 1393897"/>
+                        <a:gd name="connsiteX5" fmla="*/ 1317951 w 1467859"/>
+                        <a:gd name="connsiteY5" fmla="*/ 1248763 h 1393897"/>
+                        <a:gd name="connsiteX6" fmla="*/ 616911 w 1467859"/>
+                        <a:gd name="connsiteY6" fmla="*/ 1386558 h 1393897"/>
+                        <a:gd name="connsiteX7" fmla="*/ 334336 w 1467859"/>
+                        <a:gd name="connsiteY7" fmla="*/ 1319883 h 1393897"/>
+                        <a:gd name="connsiteX8" fmla="*/ 104466 w 1467859"/>
+                        <a:gd name="connsiteY8" fmla="*/ 1126208 h 1393897"/>
+                        <a:gd name="connsiteX9" fmla="*/ 21281 w 1467859"/>
+                        <a:gd name="connsiteY9" fmla="*/ 860778 h 1393897"/>
+                        <a:gd name="connsiteX10" fmla="*/ 4771 w 1467859"/>
+                        <a:gd name="connsiteY10" fmla="*/ 282293 h 1393897"/>
+                        <a:gd name="connsiteX11" fmla="*/ 207971 w 1467859"/>
+                        <a:gd name="connsiteY11" fmla="*/ 63853 h 1393897"/>
+                        <a:gd name="connsiteX0" fmla="*/ 207971 w 1468971"/>
+                        <a:gd name="connsiteY0" fmla="*/ 63853 h 1393897"/>
+                        <a:gd name="connsiteX1" fmla="*/ 887421 w 1468971"/>
+                        <a:gd name="connsiteY1" fmla="*/ 4163 h 1393897"/>
+                        <a:gd name="connsiteX2" fmla="*/ 1370656 w 1468971"/>
+                        <a:gd name="connsiteY2" fmla="*/ 155928 h 1393897"/>
+                        <a:gd name="connsiteX3" fmla="*/ 1461461 w 1468971"/>
+                        <a:gd name="connsiteY3" fmla="*/ 402943 h 1393897"/>
+                        <a:gd name="connsiteX4" fmla="*/ 1452571 w 1468971"/>
+                        <a:gd name="connsiteY4" fmla="*/ 992223 h 1393897"/>
+                        <a:gd name="connsiteX5" fmla="*/ 1317951 w 1468971"/>
+                        <a:gd name="connsiteY5" fmla="*/ 1248763 h 1393897"/>
+                        <a:gd name="connsiteX6" fmla="*/ 616911 w 1468971"/>
+                        <a:gd name="connsiteY6" fmla="*/ 1386558 h 1393897"/>
+                        <a:gd name="connsiteX7" fmla="*/ 334336 w 1468971"/>
+                        <a:gd name="connsiteY7" fmla="*/ 1319883 h 1393897"/>
+                        <a:gd name="connsiteX8" fmla="*/ 104466 w 1468971"/>
+                        <a:gd name="connsiteY8" fmla="*/ 1126208 h 1393897"/>
+                        <a:gd name="connsiteX9" fmla="*/ 21281 w 1468971"/>
+                        <a:gd name="connsiteY9" fmla="*/ 860778 h 1393897"/>
+                        <a:gd name="connsiteX10" fmla="*/ 4771 w 1468971"/>
+                        <a:gd name="connsiteY10" fmla="*/ 282293 h 1393897"/>
+                        <a:gd name="connsiteX11" fmla="*/ 207971 w 1468971"/>
+                        <a:gd name="connsiteY11" fmla="*/ 63853 h 1393897"/>
+                        <a:gd name="connsiteX0" fmla="*/ 207971 w 1464661"/>
+                        <a:gd name="connsiteY0" fmla="*/ 63853 h 1393897"/>
+                        <a:gd name="connsiteX1" fmla="*/ 887421 w 1464661"/>
+                        <a:gd name="connsiteY1" fmla="*/ 4163 h 1393897"/>
+                        <a:gd name="connsiteX2" fmla="*/ 1370656 w 1464661"/>
+                        <a:gd name="connsiteY2" fmla="*/ 155928 h 1393897"/>
+                        <a:gd name="connsiteX3" fmla="*/ 1461461 w 1464661"/>
+                        <a:gd name="connsiteY3" fmla="*/ 402943 h 1393897"/>
+                        <a:gd name="connsiteX4" fmla="*/ 1452571 w 1464661"/>
+                        <a:gd name="connsiteY4" fmla="*/ 992223 h 1393897"/>
+                        <a:gd name="connsiteX5" fmla="*/ 1317951 w 1464661"/>
+                        <a:gd name="connsiteY5" fmla="*/ 1248763 h 1393897"/>
+                        <a:gd name="connsiteX6" fmla="*/ 616911 w 1464661"/>
+                        <a:gd name="connsiteY6" fmla="*/ 1386558 h 1393897"/>
+                        <a:gd name="connsiteX7" fmla="*/ 334336 w 1464661"/>
+                        <a:gd name="connsiteY7" fmla="*/ 1319883 h 1393897"/>
+                        <a:gd name="connsiteX8" fmla="*/ 104466 w 1464661"/>
+                        <a:gd name="connsiteY8" fmla="*/ 1126208 h 1393897"/>
+                        <a:gd name="connsiteX9" fmla="*/ 21281 w 1464661"/>
+                        <a:gd name="connsiteY9" fmla="*/ 860778 h 1393897"/>
+                        <a:gd name="connsiteX10" fmla="*/ 4771 w 1464661"/>
+                        <a:gd name="connsiteY10" fmla="*/ 282293 h 1393897"/>
+                        <a:gd name="connsiteX11" fmla="*/ 207971 w 1464661"/>
+                        <a:gd name="connsiteY11" fmla="*/ 63853 h 1393897"/>
+                        <a:gd name="connsiteX0" fmla="*/ 207971 w 1463049"/>
+                        <a:gd name="connsiteY0" fmla="*/ 63853 h 1393897"/>
+                        <a:gd name="connsiteX1" fmla="*/ 887421 w 1463049"/>
+                        <a:gd name="connsiteY1" fmla="*/ 4163 h 1393897"/>
+                        <a:gd name="connsiteX2" fmla="*/ 1370656 w 1463049"/>
+                        <a:gd name="connsiteY2" fmla="*/ 155928 h 1393897"/>
+                        <a:gd name="connsiteX3" fmla="*/ 1461461 w 1463049"/>
+                        <a:gd name="connsiteY3" fmla="*/ 402943 h 1393897"/>
+                        <a:gd name="connsiteX4" fmla="*/ 1452571 w 1463049"/>
+                        <a:gd name="connsiteY4" fmla="*/ 992223 h 1393897"/>
+                        <a:gd name="connsiteX5" fmla="*/ 1317951 w 1463049"/>
+                        <a:gd name="connsiteY5" fmla="*/ 1248763 h 1393897"/>
+                        <a:gd name="connsiteX6" fmla="*/ 616911 w 1463049"/>
+                        <a:gd name="connsiteY6" fmla="*/ 1386558 h 1393897"/>
+                        <a:gd name="connsiteX7" fmla="*/ 334336 w 1463049"/>
+                        <a:gd name="connsiteY7" fmla="*/ 1319883 h 1393897"/>
+                        <a:gd name="connsiteX8" fmla="*/ 104466 w 1463049"/>
+                        <a:gd name="connsiteY8" fmla="*/ 1126208 h 1393897"/>
+                        <a:gd name="connsiteX9" fmla="*/ 21281 w 1463049"/>
+                        <a:gd name="connsiteY9" fmla="*/ 860778 h 1393897"/>
+                        <a:gd name="connsiteX10" fmla="*/ 4771 w 1463049"/>
+                        <a:gd name="connsiteY10" fmla="*/ 282293 h 1393897"/>
+                        <a:gd name="connsiteX11" fmla="*/ 207971 w 1463049"/>
+                        <a:gd name="connsiteY11" fmla="*/ 63853 h 1393897"/>
+                        <a:gd name="connsiteX0" fmla="*/ 207971 w 1463049"/>
+                        <a:gd name="connsiteY0" fmla="*/ 63853 h 1393897"/>
+                        <a:gd name="connsiteX1" fmla="*/ 887421 w 1463049"/>
+                        <a:gd name="connsiteY1" fmla="*/ 4163 h 1393897"/>
+                        <a:gd name="connsiteX2" fmla="*/ 1370656 w 1463049"/>
+                        <a:gd name="connsiteY2" fmla="*/ 155928 h 1393897"/>
+                        <a:gd name="connsiteX3" fmla="*/ 1461461 w 1463049"/>
+                        <a:gd name="connsiteY3" fmla="*/ 402943 h 1393897"/>
+                        <a:gd name="connsiteX4" fmla="*/ 1452571 w 1463049"/>
+                        <a:gd name="connsiteY4" fmla="*/ 992223 h 1393897"/>
+                        <a:gd name="connsiteX5" fmla="*/ 1317951 w 1463049"/>
+                        <a:gd name="connsiteY5" fmla="*/ 1248763 h 1393897"/>
+                        <a:gd name="connsiteX6" fmla="*/ 616911 w 1463049"/>
+                        <a:gd name="connsiteY6" fmla="*/ 1386558 h 1393897"/>
+                        <a:gd name="connsiteX7" fmla="*/ 334336 w 1463049"/>
+                        <a:gd name="connsiteY7" fmla="*/ 1319883 h 1393897"/>
+                        <a:gd name="connsiteX8" fmla="*/ 104466 w 1463049"/>
+                        <a:gd name="connsiteY8" fmla="*/ 1126208 h 1393897"/>
+                        <a:gd name="connsiteX9" fmla="*/ 21281 w 1463049"/>
+                        <a:gd name="connsiteY9" fmla="*/ 860778 h 1393897"/>
+                        <a:gd name="connsiteX10" fmla="*/ 4771 w 1463049"/>
+                        <a:gd name="connsiteY10" fmla="*/ 282293 h 1393897"/>
+                        <a:gd name="connsiteX11" fmla="*/ 207971 w 1463049"/>
+                        <a:gd name="connsiteY11" fmla="*/ 63853 h 1393897"/>
+                        <a:gd name="connsiteX0" fmla="*/ 207971 w 1463049"/>
+                        <a:gd name="connsiteY0" fmla="*/ 63853 h 1393897"/>
+                        <a:gd name="connsiteX1" fmla="*/ 887421 w 1463049"/>
+                        <a:gd name="connsiteY1" fmla="*/ 4163 h 1393897"/>
+                        <a:gd name="connsiteX2" fmla="*/ 1370656 w 1463049"/>
+                        <a:gd name="connsiteY2" fmla="*/ 155928 h 1393897"/>
+                        <a:gd name="connsiteX3" fmla="*/ 1461461 w 1463049"/>
+                        <a:gd name="connsiteY3" fmla="*/ 402943 h 1393897"/>
+                        <a:gd name="connsiteX4" fmla="*/ 1452571 w 1463049"/>
+                        <a:gd name="connsiteY4" fmla="*/ 992223 h 1393897"/>
+                        <a:gd name="connsiteX5" fmla="*/ 1317951 w 1463049"/>
+                        <a:gd name="connsiteY5" fmla="*/ 1248763 h 1393897"/>
+                        <a:gd name="connsiteX6" fmla="*/ 616911 w 1463049"/>
+                        <a:gd name="connsiteY6" fmla="*/ 1386558 h 1393897"/>
+                        <a:gd name="connsiteX7" fmla="*/ 334336 w 1463049"/>
+                        <a:gd name="connsiteY7" fmla="*/ 1319883 h 1393897"/>
+                        <a:gd name="connsiteX8" fmla="*/ 104466 w 1463049"/>
+                        <a:gd name="connsiteY8" fmla="*/ 1126208 h 1393897"/>
+                        <a:gd name="connsiteX9" fmla="*/ 21281 w 1463049"/>
+                        <a:gd name="connsiteY9" fmla="*/ 860778 h 1393897"/>
+                        <a:gd name="connsiteX10" fmla="*/ 4771 w 1463049"/>
+                        <a:gd name="connsiteY10" fmla="*/ 282293 h 1393897"/>
+                        <a:gd name="connsiteX11" fmla="*/ 207971 w 1463049"/>
+                        <a:gd name="connsiteY11" fmla="*/ 63853 h 1393897"/>
+                        <a:gd name="connsiteX0" fmla="*/ 207971 w 1464295"/>
+                        <a:gd name="connsiteY0" fmla="*/ 63853 h 1393897"/>
+                        <a:gd name="connsiteX1" fmla="*/ 887421 w 1464295"/>
+                        <a:gd name="connsiteY1" fmla="*/ 4163 h 1393897"/>
+                        <a:gd name="connsiteX2" fmla="*/ 1370656 w 1464295"/>
+                        <a:gd name="connsiteY2" fmla="*/ 155928 h 1393897"/>
+                        <a:gd name="connsiteX3" fmla="*/ 1461461 w 1464295"/>
+                        <a:gd name="connsiteY3" fmla="*/ 402943 h 1393897"/>
+                        <a:gd name="connsiteX4" fmla="*/ 1452571 w 1464295"/>
+                        <a:gd name="connsiteY4" fmla="*/ 992223 h 1393897"/>
+                        <a:gd name="connsiteX5" fmla="*/ 1317951 w 1464295"/>
+                        <a:gd name="connsiteY5" fmla="*/ 1248763 h 1393897"/>
+                        <a:gd name="connsiteX6" fmla="*/ 616911 w 1464295"/>
+                        <a:gd name="connsiteY6" fmla="*/ 1386558 h 1393897"/>
+                        <a:gd name="connsiteX7" fmla="*/ 334336 w 1464295"/>
+                        <a:gd name="connsiteY7" fmla="*/ 1319883 h 1393897"/>
+                        <a:gd name="connsiteX8" fmla="*/ 104466 w 1464295"/>
+                        <a:gd name="connsiteY8" fmla="*/ 1126208 h 1393897"/>
+                        <a:gd name="connsiteX9" fmla="*/ 21281 w 1464295"/>
+                        <a:gd name="connsiteY9" fmla="*/ 860778 h 1393897"/>
+                        <a:gd name="connsiteX10" fmla="*/ 4771 w 1464295"/>
+                        <a:gd name="connsiteY10" fmla="*/ 282293 h 1393897"/>
+                        <a:gd name="connsiteX11" fmla="*/ 207971 w 1464295"/>
+                        <a:gd name="connsiteY11" fmla="*/ 63853 h 1393897"/>
+                        <a:gd name="connsiteX0" fmla="*/ 196781 w 1453105"/>
+                        <a:gd name="connsiteY0" fmla="*/ 63853 h 1393897"/>
+                        <a:gd name="connsiteX1" fmla="*/ 876231 w 1453105"/>
+                        <a:gd name="connsiteY1" fmla="*/ 4163 h 1393897"/>
+                        <a:gd name="connsiteX2" fmla="*/ 1359466 w 1453105"/>
+                        <a:gd name="connsiteY2" fmla="*/ 155928 h 1393897"/>
+                        <a:gd name="connsiteX3" fmla="*/ 1450271 w 1453105"/>
+                        <a:gd name="connsiteY3" fmla="*/ 402943 h 1393897"/>
+                        <a:gd name="connsiteX4" fmla="*/ 1441381 w 1453105"/>
+                        <a:gd name="connsiteY4" fmla="*/ 992223 h 1393897"/>
+                        <a:gd name="connsiteX5" fmla="*/ 1306761 w 1453105"/>
+                        <a:gd name="connsiteY5" fmla="*/ 1248763 h 1393897"/>
+                        <a:gd name="connsiteX6" fmla="*/ 605721 w 1453105"/>
+                        <a:gd name="connsiteY6" fmla="*/ 1386558 h 1393897"/>
+                        <a:gd name="connsiteX7" fmla="*/ 323146 w 1453105"/>
+                        <a:gd name="connsiteY7" fmla="*/ 1319883 h 1393897"/>
+                        <a:gd name="connsiteX8" fmla="*/ 93276 w 1453105"/>
+                        <a:gd name="connsiteY8" fmla="*/ 1126208 h 1393897"/>
+                        <a:gd name="connsiteX9" fmla="*/ 10091 w 1453105"/>
+                        <a:gd name="connsiteY9" fmla="*/ 860778 h 1393897"/>
+                        <a:gd name="connsiteX10" fmla="*/ 6281 w 1453105"/>
+                        <a:gd name="connsiteY10" fmla="*/ 282293 h 1393897"/>
+                        <a:gd name="connsiteX11" fmla="*/ 196781 w 1453105"/>
+                        <a:gd name="connsiteY11" fmla="*/ 63853 h 1393897"/>
+                        <a:gd name="connsiteX0" fmla="*/ 197858 w 1454182"/>
+                        <a:gd name="connsiteY0" fmla="*/ 63853 h 1393897"/>
+                        <a:gd name="connsiteX1" fmla="*/ 877308 w 1454182"/>
+                        <a:gd name="connsiteY1" fmla="*/ 4163 h 1393897"/>
+                        <a:gd name="connsiteX2" fmla="*/ 1360543 w 1454182"/>
+                        <a:gd name="connsiteY2" fmla="*/ 155928 h 1393897"/>
+                        <a:gd name="connsiteX3" fmla="*/ 1451348 w 1454182"/>
+                        <a:gd name="connsiteY3" fmla="*/ 402943 h 1393897"/>
+                        <a:gd name="connsiteX4" fmla="*/ 1442458 w 1454182"/>
+                        <a:gd name="connsiteY4" fmla="*/ 992223 h 1393897"/>
+                        <a:gd name="connsiteX5" fmla="*/ 1307838 w 1454182"/>
+                        <a:gd name="connsiteY5" fmla="*/ 1248763 h 1393897"/>
+                        <a:gd name="connsiteX6" fmla="*/ 606798 w 1454182"/>
+                        <a:gd name="connsiteY6" fmla="*/ 1386558 h 1393897"/>
+                        <a:gd name="connsiteX7" fmla="*/ 324223 w 1454182"/>
+                        <a:gd name="connsiteY7" fmla="*/ 1319883 h 1393897"/>
+                        <a:gd name="connsiteX8" fmla="*/ 94353 w 1454182"/>
+                        <a:gd name="connsiteY8" fmla="*/ 1126208 h 1393897"/>
+                        <a:gd name="connsiteX9" fmla="*/ 11168 w 1454182"/>
+                        <a:gd name="connsiteY9" fmla="*/ 860778 h 1393897"/>
+                        <a:gd name="connsiteX10" fmla="*/ 7358 w 1454182"/>
+                        <a:gd name="connsiteY10" fmla="*/ 282293 h 1393897"/>
+                        <a:gd name="connsiteX11" fmla="*/ 197858 w 1454182"/>
+                        <a:gd name="connsiteY11" fmla="*/ 63853 h 1393897"/>
+                        <a:gd name="connsiteX0" fmla="*/ 197858 w 1454182"/>
+                        <a:gd name="connsiteY0" fmla="*/ 63133 h 1393177"/>
+                        <a:gd name="connsiteX1" fmla="*/ 877308 w 1454182"/>
+                        <a:gd name="connsiteY1" fmla="*/ 3443 h 1393177"/>
+                        <a:gd name="connsiteX2" fmla="*/ 1360543 w 1454182"/>
+                        <a:gd name="connsiteY2" fmla="*/ 155208 h 1393177"/>
+                        <a:gd name="connsiteX3" fmla="*/ 1451348 w 1454182"/>
+                        <a:gd name="connsiteY3" fmla="*/ 402223 h 1393177"/>
+                        <a:gd name="connsiteX4" fmla="*/ 1442458 w 1454182"/>
+                        <a:gd name="connsiteY4" fmla="*/ 991503 h 1393177"/>
+                        <a:gd name="connsiteX5" fmla="*/ 1307838 w 1454182"/>
+                        <a:gd name="connsiteY5" fmla="*/ 1248043 h 1393177"/>
+                        <a:gd name="connsiteX6" fmla="*/ 606798 w 1454182"/>
+                        <a:gd name="connsiteY6" fmla="*/ 1385838 h 1393177"/>
+                        <a:gd name="connsiteX7" fmla="*/ 324223 w 1454182"/>
+                        <a:gd name="connsiteY7" fmla="*/ 1319163 h 1393177"/>
+                        <a:gd name="connsiteX8" fmla="*/ 94353 w 1454182"/>
+                        <a:gd name="connsiteY8" fmla="*/ 1125488 h 1393177"/>
+                        <a:gd name="connsiteX9" fmla="*/ 11168 w 1454182"/>
+                        <a:gd name="connsiteY9" fmla="*/ 860058 h 1393177"/>
+                        <a:gd name="connsiteX10" fmla="*/ 7358 w 1454182"/>
+                        <a:gd name="connsiteY10" fmla="*/ 281573 h 1393177"/>
+                        <a:gd name="connsiteX11" fmla="*/ 197858 w 1454182"/>
+                        <a:gd name="connsiteY11" fmla="*/ 63133 h 1393177"/>
+                        <a:gd name="connsiteX0" fmla="*/ 197858 w 1454182"/>
+                        <a:gd name="connsiteY0" fmla="*/ 63133 h 1393177"/>
+                        <a:gd name="connsiteX1" fmla="*/ 877308 w 1454182"/>
+                        <a:gd name="connsiteY1" fmla="*/ 3443 h 1393177"/>
+                        <a:gd name="connsiteX2" fmla="*/ 1360543 w 1454182"/>
+                        <a:gd name="connsiteY2" fmla="*/ 155208 h 1393177"/>
+                        <a:gd name="connsiteX3" fmla="*/ 1451348 w 1454182"/>
+                        <a:gd name="connsiteY3" fmla="*/ 402223 h 1393177"/>
+                        <a:gd name="connsiteX4" fmla="*/ 1442458 w 1454182"/>
+                        <a:gd name="connsiteY4" fmla="*/ 991503 h 1393177"/>
+                        <a:gd name="connsiteX5" fmla="*/ 1307838 w 1454182"/>
+                        <a:gd name="connsiteY5" fmla="*/ 1248043 h 1393177"/>
+                        <a:gd name="connsiteX6" fmla="*/ 606798 w 1454182"/>
+                        <a:gd name="connsiteY6" fmla="*/ 1385838 h 1393177"/>
+                        <a:gd name="connsiteX7" fmla="*/ 324223 w 1454182"/>
+                        <a:gd name="connsiteY7" fmla="*/ 1319163 h 1393177"/>
+                        <a:gd name="connsiteX8" fmla="*/ 94353 w 1454182"/>
+                        <a:gd name="connsiteY8" fmla="*/ 1125488 h 1393177"/>
+                        <a:gd name="connsiteX9" fmla="*/ 11168 w 1454182"/>
+                        <a:gd name="connsiteY9" fmla="*/ 860058 h 1393177"/>
+                        <a:gd name="connsiteX10" fmla="*/ 7358 w 1454182"/>
+                        <a:gd name="connsiteY10" fmla="*/ 281573 h 1393177"/>
+                        <a:gd name="connsiteX11" fmla="*/ 197858 w 1454182"/>
+                        <a:gd name="connsiteY11" fmla="*/ 63133 h 1393177"/>
+                        <a:gd name="connsiteX0" fmla="*/ 197858 w 1454182"/>
+                        <a:gd name="connsiteY0" fmla="*/ 73521 h 1403565"/>
+                        <a:gd name="connsiteX1" fmla="*/ 636594 w 1454182"/>
+                        <a:gd name="connsiteY1" fmla="*/ 13741 h 1403565"/>
+                        <a:gd name="connsiteX2" fmla="*/ 877308 w 1454182"/>
+                        <a:gd name="connsiteY2" fmla="*/ 13831 h 1403565"/>
+                        <a:gd name="connsiteX3" fmla="*/ 1360543 w 1454182"/>
+                        <a:gd name="connsiteY3" fmla="*/ 165596 h 1403565"/>
+                        <a:gd name="connsiteX4" fmla="*/ 1451348 w 1454182"/>
+                        <a:gd name="connsiteY4" fmla="*/ 412611 h 1403565"/>
+                        <a:gd name="connsiteX5" fmla="*/ 1442458 w 1454182"/>
+                        <a:gd name="connsiteY5" fmla="*/ 1001891 h 1403565"/>
+                        <a:gd name="connsiteX6" fmla="*/ 1307838 w 1454182"/>
+                        <a:gd name="connsiteY6" fmla="*/ 1258431 h 1403565"/>
+                        <a:gd name="connsiteX7" fmla="*/ 606798 w 1454182"/>
+                        <a:gd name="connsiteY7" fmla="*/ 1396226 h 1403565"/>
+                        <a:gd name="connsiteX8" fmla="*/ 324223 w 1454182"/>
+                        <a:gd name="connsiteY8" fmla="*/ 1329551 h 1403565"/>
+                        <a:gd name="connsiteX9" fmla="*/ 94353 w 1454182"/>
+                        <a:gd name="connsiteY9" fmla="*/ 1135876 h 1403565"/>
+                        <a:gd name="connsiteX10" fmla="*/ 11168 w 1454182"/>
+                        <a:gd name="connsiteY10" fmla="*/ 870446 h 1403565"/>
+                        <a:gd name="connsiteX11" fmla="*/ 7358 w 1454182"/>
+                        <a:gd name="connsiteY11" fmla="*/ 291961 h 1403565"/>
+                        <a:gd name="connsiteX12" fmla="*/ 197858 w 1454182"/>
+                        <a:gd name="connsiteY12" fmla="*/ 73521 h 1403565"/>
+                        <a:gd name="connsiteX0" fmla="*/ 197858 w 1454182"/>
+                        <a:gd name="connsiteY0" fmla="*/ 73521 h 1403565"/>
+                        <a:gd name="connsiteX1" fmla="*/ 636594 w 1454182"/>
+                        <a:gd name="connsiteY1" fmla="*/ 13741 h 1403565"/>
+                        <a:gd name="connsiteX2" fmla="*/ 877308 w 1454182"/>
+                        <a:gd name="connsiteY2" fmla="*/ 13831 h 1403565"/>
+                        <a:gd name="connsiteX3" fmla="*/ 1360543 w 1454182"/>
+                        <a:gd name="connsiteY3" fmla="*/ 165596 h 1403565"/>
+                        <a:gd name="connsiteX4" fmla="*/ 1451348 w 1454182"/>
+                        <a:gd name="connsiteY4" fmla="*/ 412611 h 1403565"/>
+                        <a:gd name="connsiteX5" fmla="*/ 1442458 w 1454182"/>
+                        <a:gd name="connsiteY5" fmla="*/ 1001891 h 1403565"/>
+                        <a:gd name="connsiteX6" fmla="*/ 1307838 w 1454182"/>
+                        <a:gd name="connsiteY6" fmla="*/ 1258431 h 1403565"/>
+                        <a:gd name="connsiteX7" fmla="*/ 606798 w 1454182"/>
+                        <a:gd name="connsiteY7" fmla="*/ 1396226 h 1403565"/>
+                        <a:gd name="connsiteX8" fmla="*/ 324223 w 1454182"/>
+                        <a:gd name="connsiteY8" fmla="*/ 1329551 h 1403565"/>
+                        <a:gd name="connsiteX9" fmla="*/ 94353 w 1454182"/>
+                        <a:gd name="connsiteY9" fmla="*/ 1135876 h 1403565"/>
+                        <a:gd name="connsiteX10" fmla="*/ 11168 w 1454182"/>
+                        <a:gd name="connsiteY10" fmla="*/ 870446 h 1403565"/>
+                        <a:gd name="connsiteX11" fmla="*/ 7358 w 1454182"/>
+                        <a:gd name="connsiteY11" fmla="*/ 291961 h 1403565"/>
+                        <a:gd name="connsiteX12" fmla="*/ 197858 w 1454182"/>
+                        <a:gd name="connsiteY12" fmla="*/ 73521 h 1403565"/>
+                        <a:gd name="connsiteX0" fmla="*/ 197858 w 1454182"/>
+                        <a:gd name="connsiteY0" fmla="*/ 76749 h 1406793"/>
+                        <a:gd name="connsiteX1" fmla="*/ 636594 w 1454182"/>
+                        <a:gd name="connsiteY1" fmla="*/ 10263 h 1406793"/>
+                        <a:gd name="connsiteX2" fmla="*/ 877308 w 1454182"/>
+                        <a:gd name="connsiteY2" fmla="*/ 17059 h 1406793"/>
+                        <a:gd name="connsiteX3" fmla="*/ 1360543 w 1454182"/>
+                        <a:gd name="connsiteY3" fmla="*/ 168824 h 1406793"/>
+                        <a:gd name="connsiteX4" fmla="*/ 1451348 w 1454182"/>
+                        <a:gd name="connsiteY4" fmla="*/ 415839 h 1406793"/>
+                        <a:gd name="connsiteX5" fmla="*/ 1442458 w 1454182"/>
+                        <a:gd name="connsiteY5" fmla="*/ 1005119 h 1406793"/>
+                        <a:gd name="connsiteX6" fmla="*/ 1307838 w 1454182"/>
+                        <a:gd name="connsiteY6" fmla="*/ 1261659 h 1406793"/>
+                        <a:gd name="connsiteX7" fmla="*/ 606798 w 1454182"/>
+                        <a:gd name="connsiteY7" fmla="*/ 1399454 h 1406793"/>
+                        <a:gd name="connsiteX8" fmla="*/ 324223 w 1454182"/>
+                        <a:gd name="connsiteY8" fmla="*/ 1332779 h 1406793"/>
+                        <a:gd name="connsiteX9" fmla="*/ 94353 w 1454182"/>
+                        <a:gd name="connsiteY9" fmla="*/ 1139104 h 1406793"/>
+                        <a:gd name="connsiteX10" fmla="*/ 11168 w 1454182"/>
+                        <a:gd name="connsiteY10" fmla="*/ 873674 h 1406793"/>
+                        <a:gd name="connsiteX11" fmla="*/ 7358 w 1454182"/>
+                        <a:gd name="connsiteY11" fmla="*/ 295189 h 1406793"/>
+                        <a:gd name="connsiteX12" fmla="*/ 197858 w 1454182"/>
+                        <a:gd name="connsiteY12" fmla="*/ 76749 h 1406793"/>
+                        <a:gd name="connsiteX0" fmla="*/ 188326 w 1457628"/>
+                        <a:gd name="connsiteY0" fmla="*/ 85132 h 1406793"/>
+                        <a:gd name="connsiteX1" fmla="*/ 640040 w 1457628"/>
+                        <a:gd name="connsiteY1" fmla="*/ 10263 h 1406793"/>
+                        <a:gd name="connsiteX2" fmla="*/ 880754 w 1457628"/>
+                        <a:gd name="connsiteY2" fmla="*/ 17059 h 1406793"/>
+                        <a:gd name="connsiteX3" fmla="*/ 1363989 w 1457628"/>
+                        <a:gd name="connsiteY3" fmla="*/ 168824 h 1406793"/>
+                        <a:gd name="connsiteX4" fmla="*/ 1454794 w 1457628"/>
+                        <a:gd name="connsiteY4" fmla="*/ 415839 h 1406793"/>
+                        <a:gd name="connsiteX5" fmla="*/ 1445904 w 1457628"/>
+                        <a:gd name="connsiteY5" fmla="*/ 1005119 h 1406793"/>
+                        <a:gd name="connsiteX6" fmla="*/ 1311284 w 1457628"/>
+                        <a:gd name="connsiteY6" fmla="*/ 1261659 h 1406793"/>
+                        <a:gd name="connsiteX7" fmla="*/ 610244 w 1457628"/>
+                        <a:gd name="connsiteY7" fmla="*/ 1399454 h 1406793"/>
+                        <a:gd name="connsiteX8" fmla="*/ 327669 w 1457628"/>
+                        <a:gd name="connsiteY8" fmla="*/ 1332779 h 1406793"/>
+                        <a:gd name="connsiteX9" fmla="*/ 97799 w 1457628"/>
+                        <a:gd name="connsiteY9" fmla="*/ 1139104 h 1406793"/>
+                        <a:gd name="connsiteX10" fmla="*/ 14614 w 1457628"/>
+                        <a:gd name="connsiteY10" fmla="*/ 873674 h 1406793"/>
+                        <a:gd name="connsiteX11" fmla="*/ 10804 w 1457628"/>
+                        <a:gd name="connsiteY11" fmla="*/ 295189 h 1406793"/>
+                        <a:gd name="connsiteX12" fmla="*/ 188326 w 1457628"/>
+                        <a:gd name="connsiteY12" fmla="*/ 85132 h 1406793"/>
+                        <a:gd name="connsiteX0" fmla="*/ 186831 w 1456133"/>
+                        <a:gd name="connsiteY0" fmla="*/ 85132 h 1406793"/>
+                        <a:gd name="connsiteX1" fmla="*/ 638545 w 1456133"/>
+                        <a:gd name="connsiteY1" fmla="*/ 10263 h 1406793"/>
+                        <a:gd name="connsiteX2" fmla="*/ 879259 w 1456133"/>
+                        <a:gd name="connsiteY2" fmla="*/ 17059 h 1406793"/>
+                        <a:gd name="connsiteX3" fmla="*/ 1362494 w 1456133"/>
+                        <a:gd name="connsiteY3" fmla="*/ 168824 h 1406793"/>
+                        <a:gd name="connsiteX4" fmla="*/ 1453299 w 1456133"/>
+                        <a:gd name="connsiteY4" fmla="*/ 415839 h 1406793"/>
+                        <a:gd name="connsiteX5" fmla="*/ 1444409 w 1456133"/>
+                        <a:gd name="connsiteY5" fmla="*/ 1005119 h 1406793"/>
+                        <a:gd name="connsiteX6" fmla="*/ 1309789 w 1456133"/>
+                        <a:gd name="connsiteY6" fmla="*/ 1261659 h 1406793"/>
+                        <a:gd name="connsiteX7" fmla="*/ 608749 w 1456133"/>
+                        <a:gd name="connsiteY7" fmla="*/ 1399454 h 1406793"/>
+                        <a:gd name="connsiteX8" fmla="*/ 326174 w 1456133"/>
+                        <a:gd name="connsiteY8" fmla="*/ 1332779 h 1406793"/>
+                        <a:gd name="connsiteX9" fmla="*/ 96304 w 1456133"/>
+                        <a:gd name="connsiteY9" fmla="*/ 1139104 h 1406793"/>
+                        <a:gd name="connsiteX10" fmla="*/ 13119 w 1456133"/>
+                        <a:gd name="connsiteY10" fmla="*/ 873674 h 1406793"/>
+                        <a:gd name="connsiteX11" fmla="*/ 11163 w 1456133"/>
+                        <a:gd name="connsiteY11" fmla="*/ 295189 h 1406793"/>
+                        <a:gd name="connsiteX12" fmla="*/ 186831 w 1456133"/>
+                        <a:gd name="connsiteY12" fmla="*/ 85132 h 1406793"/>
+                        <a:gd name="connsiteX0" fmla="*/ 182003 w 1451305"/>
+                        <a:gd name="connsiteY0" fmla="*/ 85132 h 1406793"/>
+                        <a:gd name="connsiteX1" fmla="*/ 633717 w 1451305"/>
+                        <a:gd name="connsiteY1" fmla="*/ 10263 h 1406793"/>
+                        <a:gd name="connsiteX2" fmla="*/ 874431 w 1451305"/>
+                        <a:gd name="connsiteY2" fmla="*/ 17059 h 1406793"/>
+                        <a:gd name="connsiteX3" fmla="*/ 1357666 w 1451305"/>
+                        <a:gd name="connsiteY3" fmla="*/ 168824 h 1406793"/>
+                        <a:gd name="connsiteX4" fmla="*/ 1448471 w 1451305"/>
+                        <a:gd name="connsiteY4" fmla="*/ 415839 h 1406793"/>
+                        <a:gd name="connsiteX5" fmla="*/ 1439581 w 1451305"/>
+                        <a:gd name="connsiteY5" fmla="*/ 1005119 h 1406793"/>
+                        <a:gd name="connsiteX6" fmla="*/ 1304961 w 1451305"/>
+                        <a:gd name="connsiteY6" fmla="*/ 1261659 h 1406793"/>
+                        <a:gd name="connsiteX7" fmla="*/ 603921 w 1451305"/>
+                        <a:gd name="connsiteY7" fmla="*/ 1399454 h 1406793"/>
+                        <a:gd name="connsiteX8" fmla="*/ 321346 w 1451305"/>
+                        <a:gd name="connsiteY8" fmla="*/ 1332779 h 1406793"/>
+                        <a:gd name="connsiteX9" fmla="*/ 91476 w 1451305"/>
+                        <a:gd name="connsiteY9" fmla="*/ 1139104 h 1406793"/>
+                        <a:gd name="connsiteX10" fmla="*/ 8291 w 1451305"/>
+                        <a:gd name="connsiteY10" fmla="*/ 873674 h 1406793"/>
+                        <a:gd name="connsiteX11" fmla="*/ 6335 w 1451305"/>
+                        <a:gd name="connsiteY11" fmla="*/ 295189 h 1406793"/>
+                        <a:gd name="connsiteX12" fmla="*/ 182003 w 1451305"/>
+                        <a:gd name="connsiteY12" fmla="*/ 85132 h 1406793"/>
+                        <a:gd name="connsiteX0" fmla="*/ 186830 w 1456132"/>
+                        <a:gd name="connsiteY0" fmla="*/ 86809 h 1406793"/>
+                        <a:gd name="connsiteX1" fmla="*/ 638544 w 1456132"/>
+                        <a:gd name="connsiteY1" fmla="*/ 10263 h 1406793"/>
+                        <a:gd name="connsiteX2" fmla="*/ 879258 w 1456132"/>
+                        <a:gd name="connsiteY2" fmla="*/ 17059 h 1406793"/>
+                        <a:gd name="connsiteX3" fmla="*/ 1362493 w 1456132"/>
+                        <a:gd name="connsiteY3" fmla="*/ 168824 h 1406793"/>
+                        <a:gd name="connsiteX4" fmla="*/ 1453298 w 1456132"/>
+                        <a:gd name="connsiteY4" fmla="*/ 415839 h 1406793"/>
+                        <a:gd name="connsiteX5" fmla="*/ 1444408 w 1456132"/>
+                        <a:gd name="connsiteY5" fmla="*/ 1005119 h 1406793"/>
+                        <a:gd name="connsiteX6" fmla="*/ 1309788 w 1456132"/>
+                        <a:gd name="connsiteY6" fmla="*/ 1261659 h 1406793"/>
+                        <a:gd name="connsiteX7" fmla="*/ 608748 w 1456132"/>
+                        <a:gd name="connsiteY7" fmla="*/ 1399454 h 1406793"/>
+                        <a:gd name="connsiteX8" fmla="*/ 326173 w 1456132"/>
+                        <a:gd name="connsiteY8" fmla="*/ 1332779 h 1406793"/>
+                        <a:gd name="connsiteX9" fmla="*/ 96303 w 1456132"/>
+                        <a:gd name="connsiteY9" fmla="*/ 1139104 h 1406793"/>
+                        <a:gd name="connsiteX10" fmla="*/ 13118 w 1456132"/>
+                        <a:gd name="connsiteY10" fmla="*/ 873674 h 1406793"/>
+                        <a:gd name="connsiteX11" fmla="*/ 11162 w 1456132"/>
+                        <a:gd name="connsiteY11" fmla="*/ 295189 h 1406793"/>
+                        <a:gd name="connsiteX12" fmla="*/ 186830 w 1456132"/>
+                        <a:gd name="connsiteY12" fmla="*/ 86809 h 1406793"/>
+                        <a:gd name="connsiteX0" fmla="*/ 180864 w 1455728"/>
+                        <a:gd name="connsiteY0" fmla="*/ 85132 h 1406793"/>
+                        <a:gd name="connsiteX1" fmla="*/ 638140 w 1455728"/>
+                        <a:gd name="connsiteY1" fmla="*/ 10263 h 1406793"/>
+                        <a:gd name="connsiteX2" fmla="*/ 878854 w 1455728"/>
+                        <a:gd name="connsiteY2" fmla="*/ 17059 h 1406793"/>
+                        <a:gd name="connsiteX3" fmla="*/ 1362089 w 1455728"/>
+                        <a:gd name="connsiteY3" fmla="*/ 168824 h 1406793"/>
+                        <a:gd name="connsiteX4" fmla="*/ 1452894 w 1455728"/>
+                        <a:gd name="connsiteY4" fmla="*/ 415839 h 1406793"/>
+                        <a:gd name="connsiteX5" fmla="*/ 1444004 w 1455728"/>
+                        <a:gd name="connsiteY5" fmla="*/ 1005119 h 1406793"/>
+                        <a:gd name="connsiteX6" fmla="*/ 1309384 w 1455728"/>
+                        <a:gd name="connsiteY6" fmla="*/ 1261659 h 1406793"/>
+                        <a:gd name="connsiteX7" fmla="*/ 608344 w 1455728"/>
+                        <a:gd name="connsiteY7" fmla="*/ 1399454 h 1406793"/>
+                        <a:gd name="connsiteX8" fmla="*/ 325769 w 1455728"/>
+                        <a:gd name="connsiteY8" fmla="*/ 1332779 h 1406793"/>
+                        <a:gd name="connsiteX9" fmla="*/ 95899 w 1455728"/>
+                        <a:gd name="connsiteY9" fmla="*/ 1139104 h 1406793"/>
+                        <a:gd name="connsiteX10" fmla="*/ 12714 w 1455728"/>
+                        <a:gd name="connsiteY10" fmla="*/ 873674 h 1406793"/>
+                        <a:gd name="connsiteX11" fmla="*/ 10758 w 1455728"/>
+                        <a:gd name="connsiteY11" fmla="*/ 295189 h 1406793"/>
+                        <a:gd name="connsiteX12" fmla="*/ 180864 w 1455728"/>
+                        <a:gd name="connsiteY12" fmla="*/ 85132 h 1406793"/>
+                        <a:gd name="connsiteX0" fmla="*/ 180864 w 1455728"/>
+                        <a:gd name="connsiteY0" fmla="*/ 85132 h 1406793"/>
+                        <a:gd name="connsiteX1" fmla="*/ 638140 w 1455728"/>
+                        <a:gd name="connsiteY1" fmla="*/ 10263 h 1406793"/>
+                        <a:gd name="connsiteX2" fmla="*/ 878854 w 1455728"/>
+                        <a:gd name="connsiteY2" fmla="*/ 17059 h 1406793"/>
+                        <a:gd name="connsiteX3" fmla="*/ 1362089 w 1455728"/>
+                        <a:gd name="connsiteY3" fmla="*/ 168824 h 1406793"/>
+                        <a:gd name="connsiteX4" fmla="*/ 1452894 w 1455728"/>
+                        <a:gd name="connsiteY4" fmla="*/ 415839 h 1406793"/>
+                        <a:gd name="connsiteX5" fmla="*/ 1444004 w 1455728"/>
+                        <a:gd name="connsiteY5" fmla="*/ 1005119 h 1406793"/>
+                        <a:gd name="connsiteX6" fmla="*/ 1309384 w 1455728"/>
+                        <a:gd name="connsiteY6" fmla="*/ 1261659 h 1406793"/>
+                        <a:gd name="connsiteX7" fmla="*/ 608344 w 1455728"/>
+                        <a:gd name="connsiteY7" fmla="*/ 1399454 h 1406793"/>
+                        <a:gd name="connsiteX8" fmla="*/ 325769 w 1455728"/>
+                        <a:gd name="connsiteY8" fmla="*/ 1332779 h 1406793"/>
+                        <a:gd name="connsiteX9" fmla="*/ 95899 w 1455728"/>
+                        <a:gd name="connsiteY9" fmla="*/ 1139104 h 1406793"/>
+                        <a:gd name="connsiteX10" fmla="*/ 12714 w 1455728"/>
+                        <a:gd name="connsiteY10" fmla="*/ 873674 h 1406793"/>
+                        <a:gd name="connsiteX11" fmla="*/ 10758 w 1455728"/>
+                        <a:gd name="connsiteY11" fmla="*/ 295189 h 1406793"/>
+                        <a:gd name="connsiteX12" fmla="*/ 180864 w 1455728"/>
+                        <a:gd name="connsiteY12" fmla="*/ 85132 h 1406793"/>
+                        <a:gd name="connsiteX0" fmla="*/ 180864 w 1455728"/>
+                        <a:gd name="connsiteY0" fmla="*/ 85132 h 1406793"/>
+                        <a:gd name="connsiteX1" fmla="*/ 638140 w 1455728"/>
+                        <a:gd name="connsiteY1" fmla="*/ 10263 h 1406793"/>
+                        <a:gd name="connsiteX2" fmla="*/ 878854 w 1455728"/>
+                        <a:gd name="connsiteY2" fmla="*/ 17059 h 1406793"/>
+                        <a:gd name="connsiteX3" fmla="*/ 1362089 w 1455728"/>
+                        <a:gd name="connsiteY3" fmla="*/ 168824 h 1406793"/>
+                        <a:gd name="connsiteX4" fmla="*/ 1452894 w 1455728"/>
+                        <a:gd name="connsiteY4" fmla="*/ 415839 h 1406793"/>
+                        <a:gd name="connsiteX5" fmla="*/ 1444004 w 1455728"/>
+                        <a:gd name="connsiteY5" fmla="*/ 1005119 h 1406793"/>
+                        <a:gd name="connsiteX6" fmla="*/ 1309384 w 1455728"/>
+                        <a:gd name="connsiteY6" fmla="*/ 1261659 h 1406793"/>
+                        <a:gd name="connsiteX7" fmla="*/ 608344 w 1455728"/>
+                        <a:gd name="connsiteY7" fmla="*/ 1399454 h 1406793"/>
+                        <a:gd name="connsiteX8" fmla="*/ 325769 w 1455728"/>
+                        <a:gd name="connsiteY8" fmla="*/ 1332779 h 1406793"/>
+                        <a:gd name="connsiteX9" fmla="*/ 95899 w 1455728"/>
+                        <a:gd name="connsiteY9" fmla="*/ 1139104 h 1406793"/>
+                        <a:gd name="connsiteX10" fmla="*/ 12714 w 1455728"/>
+                        <a:gd name="connsiteY10" fmla="*/ 873674 h 1406793"/>
+                        <a:gd name="connsiteX11" fmla="*/ 10758 w 1455728"/>
+                        <a:gd name="connsiteY11" fmla="*/ 295189 h 1406793"/>
+                        <a:gd name="connsiteX12" fmla="*/ 180864 w 1455728"/>
+                        <a:gd name="connsiteY12" fmla="*/ 85132 h 1406793"/>
+                        <a:gd name="connsiteX0" fmla="*/ 181195 w 1456059"/>
+                        <a:gd name="connsiteY0" fmla="*/ 85132 h 1406793"/>
+                        <a:gd name="connsiteX1" fmla="*/ 638471 w 1456059"/>
+                        <a:gd name="connsiteY1" fmla="*/ 10263 h 1406793"/>
+                        <a:gd name="connsiteX2" fmla="*/ 879185 w 1456059"/>
+                        <a:gd name="connsiteY2" fmla="*/ 17059 h 1406793"/>
+                        <a:gd name="connsiteX3" fmla="*/ 1362420 w 1456059"/>
+                        <a:gd name="connsiteY3" fmla="*/ 168824 h 1406793"/>
+                        <a:gd name="connsiteX4" fmla="*/ 1453225 w 1456059"/>
+                        <a:gd name="connsiteY4" fmla="*/ 415839 h 1406793"/>
+                        <a:gd name="connsiteX5" fmla="*/ 1444335 w 1456059"/>
+                        <a:gd name="connsiteY5" fmla="*/ 1005119 h 1406793"/>
+                        <a:gd name="connsiteX6" fmla="*/ 1309715 w 1456059"/>
+                        <a:gd name="connsiteY6" fmla="*/ 1261659 h 1406793"/>
+                        <a:gd name="connsiteX7" fmla="*/ 608675 w 1456059"/>
+                        <a:gd name="connsiteY7" fmla="*/ 1399454 h 1406793"/>
+                        <a:gd name="connsiteX8" fmla="*/ 326100 w 1456059"/>
+                        <a:gd name="connsiteY8" fmla="*/ 1332779 h 1406793"/>
+                        <a:gd name="connsiteX9" fmla="*/ 96230 w 1456059"/>
+                        <a:gd name="connsiteY9" fmla="*/ 1139104 h 1406793"/>
+                        <a:gd name="connsiteX10" fmla="*/ 13045 w 1456059"/>
+                        <a:gd name="connsiteY10" fmla="*/ 873674 h 1406793"/>
+                        <a:gd name="connsiteX11" fmla="*/ 11089 w 1456059"/>
+                        <a:gd name="connsiteY11" fmla="*/ 295189 h 1406793"/>
+                        <a:gd name="connsiteX12" fmla="*/ 181195 w 1456059"/>
+                        <a:gd name="connsiteY12" fmla="*/ 85132 h 1406793"/>
+                        <a:gd name="connsiteX0" fmla="*/ 184959 w 1459823"/>
+                        <a:gd name="connsiteY0" fmla="*/ 85132 h 1406793"/>
+                        <a:gd name="connsiteX1" fmla="*/ 642235 w 1459823"/>
+                        <a:gd name="connsiteY1" fmla="*/ 10263 h 1406793"/>
+                        <a:gd name="connsiteX2" fmla="*/ 882949 w 1459823"/>
+                        <a:gd name="connsiteY2" fmla="*/ 17059 h 1406793"/>
+                        <a:gd name="connsiteX3" fmla="*/ 1366184 w 1459823"/>
+                        <a:gd name="connsiteY3" fmla="*/ 168824 h 1406793"/>
+                        <a:gd name="connsiteX4" fmla="*/ 1456989 w 1459823"/>
+                        <a:gd name="connsiteY4" fmla="*/ 415839 h 1406793"/>
+                        <a:gd name="connsiteX5" fmla="*/ 1448099 w 1459823"/>
+                        <a:gd name="connsiteY5" fmla="*/ 1005119 h 1406793"/>
+                        <a:gd name="connsiteX6" fmla="*/ 1313479 w 1459823"/>
+                        <a:gd name="connsiteY6" fmla="*/ 1261659 h 1406793"/>
+                        <a:gd name="connsiteX7" fmla="*/ 612439 w 1459823"/>
+                        <a:gd name="connsiteY7" fmla="*/ 1399454 h 1406793"/>
+                        <a:gd name="connsiteX8" fmla="*/ 329864 w 1459823"/>
+                        <a:gd name="connsiteY8" fmla="*/ 1332779 h 1406793"/>
+                        <a:gd name="connsiteX9" fmla="*/ 99994 w 1459823"/>
+                        <a:gd name="connsiteY9" fmla="*/ 1139104 h 1406793"/>
+                        <a:gd name="connsiteX10" fmla="*/ 5685 w 1459823"/>
+                        <a:gd name="connsiteY10" fmla="*/ 873674 h 1406793"/>
+                        <a:gd name="connsiteX11" fmla="*/ 14853 w 1459823"/>
+                        <a:gd name="connsiteY11" fmla="*/ 295189 h 1406793"/>
+                        <a:gd name="connsiteX12" fmla="*/ 184959 w 1459823"/>
+                        <a:gd name="connsiteY12" fmla="*/ 85132 h 1406793"/>
+                        <a:gd name="connsiteX0" fmla="*/ 184959 w 1459823"/>
+                        <a:gd name="connsiteY0" fmla="*/ 85132 h 1406793"/>
+                        <a:gd name="connsiteX1" fmla="*/ 642235 w 1459823"/>
+                        <a:gd name="connsiteY1" fmla="*/ 10263 h 1406793"/>
+                        <a:gd name="connsiteX2" fmla="*/ 882949 w 1459823"/>
+                        <a:gd name="connsiteY2" fmla="*/ 17059 h 1406793"/>
+                        <a:gd name="connsiteX3" fmla="*/ 1366184 w 1459823"/>
+                        <a:gd name="connsiteY3" fmla="*/ 168824 h 1406793"/>
+                        <a:gd name="connsiteX4" fmla="*/ 1456989 w 1459823"/>
+                        <a:gd name="connsiteY4" fmla="*/ 415839 h 1406793"/>
+                        <a:gd name="connsiteX5" fmla="*/ 1448099 w 1459823"/>
+                        <a:gd name="connsiteY5" fmla="*/ 1005119 h 1406793"/>
+                        <a:gd name="connsiteX6" fmla="*/ 1313479 w 1459823"/>
+                        <a:gd name="connsiteY6" fmla="*/ 1261659 h 1406793"/>
+                        <a:gd name="connsiteX7" fmla="*/ 612439 w 1459823"/>
+                        <a:gd name="connsiteY7" fmla="*/ 1399454 h 1406793"/>
+                        <a:gd name="connsiteX8" fmla="*/ 329864 w 1459823"/>
+                        <a:gd name="connsiteY8" fmla="*/ 1332779 h 1406793"/>
+                        <a:gd name="connsiteX9" fmla="*/ 99994 w 1459823"/>
+                        <a:gd name="connsiteY9" fmla="*/ 1139104 h 1406793"/>
+                        <a:gd name="connsiteX10" fmla="*/ 5685 w 1459823"/>
+                        <a:gd name="connsiteY10" fmla="*/ 873674 h 1406793"/>
+                        <a:gd name="connsiteX11" fmla="*/ 14853 w 1459823"/>
+                        <a:gd name="connsiteY11" fmla="*/ 295189 h 1406793"/>
+                        <a:gd name="connsiteX12" fmla="*/ 184959 w 1459823"/>
+                        <a:gd name="connsiteY12" fmla="*/ 85132 h 1406793"/>
+                        <a:gd name="connsiteX0" fmla="*/ 184959 w 1459823"/>
+                        <a:gd name="connsiteY0" fmla="*/ 85132 h 1406210"/>
+                        <a:gd name="connsiteX1" fmla="*/ 642235 w 1459823"/>
+                        <a:gd name="connsiteY1" fmla="*/ 10263 h 1406210"/>
+                        <a:gd name="connsiteX2" fmla="*/ 882949 w 1459823"/>
+                        <a:gd name="connsiteY2" fmla="*/ 17059 h 1406210"/>
+                        <a:gd name="connsiteX3" fmla="*/ 1366184 w 1459823"/>
+                        <a:gd name="connsiteY3" fmla="*/ 168824 h 1406210"/>
+                        <a:gd name="connsiteX4" fmla="*/ 1456989 w 1459823"/>
+                        <a:gd name="connsiteY4" fmla="*/ 415839 h 1406210"/>
+                        <a:gd name="connsiteX5" fmla="*/ 1448099 w 1459823"/>
+                        <a:gd name="connsiteY5" fmla="*/ 1005119 h 1406210"/>
+                        <a:gd name="connsiteX6" fmla="*/ 1313479 w 1459823"/>
+                        <a:gd name="connsiteY6" fmla="*/ 1261659 h 1406210"/>
+                        <a:gd name="connsiteX7" fmla="*/ 612439 w 1459823"/>
+                        <a:gd name="connsiteY7" fmla="*/ 1399454 h 1406210"/>
+                        <a:gd name="connsiteX8" fmla="*/ 329864 w 1459823"/>
+                        <a:gd name="connsiteY8" fmla="*/ 1332779 h 1406210"/>
+                        <a:gd name="connsiteX9" fmla="*/ 99994 w 1459823"/>
+                        <a:gd name="connsiteY9" fmla="*/ 1139104 h 1406210"/>
+                        <a:gd name="connsiteX10" fmla="*/ 5685 w 1459823"/>
+                        <a:gd name="connsiteY10" fmla="*/ 873674 h 1406210"/>
+                        <a:gd name="connsiteX11" fmla="*/ 14853 w 1459823"/>
+                        <a:gd name="connsiteY11" fmla="*/ 295189 h 1406210"/>
+                        <a:gd name="connsiteX12" fmla="*/ 184959 w 1459823"/>
+                        <a:gd name="connsiteY12" fmla="*/ 85132 h 1406210"/>
+                      </a:gdLst>
+                      <a:ahLst/>
+                      <a:cxnLst>
+                        <a:cxn ang="0">
+                          <a:pos x="connsiteX0" y="connsiteY0"/>
+                        </a:cxn>
+                        <a:cxn ang="0">
+                          <a:pos x="connsiteX1" y="connsiteY1"/>
+                        </a:cxn>
+                        <a:cxn ang="0">
+                          <a:pos x="connsiteX2" y="connsiteY2"/>
+                        </a:cxn>
+                        <a:cxn ang="0">
+                          <a:pos x="connsiteX3" y="connsiteY3"/>
+                        </a:cxn>
+                        <a:cxn ang="0">
+                          <a:pos x="connsiteX4" y="connsiteY4"/>
+                        </a:cxn>
+                        <a:cxn ang="0">
+                          <a:pos x="connsiteX5" y="connsiteY5"/>
+                        </a:cxn>
+                        <a:cxn ang="0">
+                          <a:pos x="connsiteX6" y="connsiteY6"/>
+                        </a:cxn>
+                        <a:cxn ang="0">
+                          <a:pos x="connsiteX7" y="connsiteY7"/>
+                        </a:cxn>
+                        <a:cxn ang="0">
+                          <a:pos x="connsiteX8" y="connsiteY8"/>
+                        </a:cxn>
+                        <a:cxn ang="0">
+                          <a:pos x="connsiteX9" y="connsiteY9"/>
+                        </a:cxn>
+                        <a:cxn ang="0">
+                          <a:pos x="connsiteX10" y="connsiteY10"/>
+                        </a:cxn>
+                        <a:cxn ang="0">
+                          <a:pos x="connsiteX11" y="connsiteY11"/>
+                        </a:cxn>
+                        <a:cxn ang="0">
+                          <a:pos x="connsiteX12" y="connsiteY12"/>
+                        </a:cxn>
+                      </a:cxnLst>
+                      <a:rect l="l" t="t" r="r" b="b"/>
+                      <a:pathLst>
+                        <a:path w="1459823" h="1406210">
+                          <a:moveTo>
+                            <a:pt x="184959" y="85132"/>
+                          </a:moveTo>
+                          <a:cubicBezTo>
+                            <a:pt x="295085" y="40997"/>
+                            <a:pt x="504892" y="25240"/>
+                            <a:pt x="642235" y="10263"/>
+                          </a:cubicBezTo>
+                          <a:cubicBezTo>
+                            <a:pt x="755477" y="315"/>
+                            <a:pt x="762291" y="-9368"/>
+                            <a:pt x="882949" y="17059"/>
+                          </a:cubicBezTo>
+                          <a:cubicBezTo>
+                            <a:pt x="1003607" y="43486"/>
+                            <a:pt x="1270511" y="102361"/>
+                            <a:pt x="1366184" y="168824"/>
+                          </a:cubicBezTo>
+                          <a:cubicBezTo>
+                            <a:pt x="1461857" y="235287"/>
+                            <a:pt x="1454132" y="266297"/>
+                            <a:pt x="1456989" y="415839"/>
+                          </a:cubicBezTo>
+                          <a:cubicBezTo>
+                            <a:pt x="1459846" y="565381"/>
+                            <a:pt x="1464397" y="864149"/>
+                            <a:pt x="1448099" y="1005119"/>
+                          </a:cubicBezTo>
+                          <a:cubicBezTo>
+                            <a:pt x="1431801" y="1146089"/>
+                            <a:pt x="1452756" y="1195937"/>
+                            <a:pt x="1313479" y="1261659"/>
+                          </a:cubicBezTo>
+                          <a:cubicBezTo>
+                            <a:pt x="1174202" y="1327381"/>
+                            <a:pt x="776375" y="1378076"/>
+                            <a:pt x="612439" y="1399454"/>
+                          </a:cubicBezTo>
+                          <a:cubicBezTo>
+                            <a:pt x="448503" y="1420832"/>
+                            <a:pt x="414242" y="1389556"/>
+                            <a:pt x="329864" y="1332779"/>
+                          </a:cubicBezTo>
+                          <a:cubicBezTo>
+                            <a:pt x="245486" y="1276002"/>
+                            <a:pt x="165148" y="1215621"/>
+                            <a:pt x="99994" y="1139104"/>
+                          </a:cubicBezTo>
+                          <a:cubicBezTo>
+                            <a:pt x="34840" y="1062587"/>
+                            <a:pt x="7590" y="1056130"/>
+                            <a:pt x="5685" y="873674"/>
+                          </a:cubicBezTo>
+                          <a:cubicBezTo>
+                            <a:pt x="10181" y="729318"/>
+                            <a:pt x="-15026" y="426613"/>
+                            <a:pt x="14853" y="295189"/>
+                          </a:cubicBezTo>
+                          <a:cubicBezTo>
+                            <a:pt x="44732" y="163765"/>
+                            <a:pt x="74833" y="129267"/>
+                            <a:pt x="184959" y="85132"/>
+                          </a:cubicBezTo>
+                          <a:close/>
+                        </a:path>
+                      </a:pathLst>
+                    </a:custGeom>
+                    <a:noFill/>
+                    <a:ln w="127000">
+                      <a:solidFill>
+                        <a:srgbClr val="00B0F0"/>
+                      </a:solidFill>
+                    </a:ln>
+                  </p:spPr>
+                  <p:style>
+                    <a:lnRef idx="2">
+                      <a:schemeClr val="accent1">
+                        <a:shade val="50000"/>
+                      </a:schemeClr>
+                    </a:lnRef>
+                    <a:fillRef idx="1">
+                      <a:schemeClr val="accent1"/>
+                    </a:fillRef>
+                    <a:effectRef idx="0">
+                      <a:schemeClr val="accent1"/>
+                    </a:effectRef>
+                    <a:fontRef idx="minor">
+                      <a:schemeClr val="lt1"/>
+                    </a:fontRef>
+                  </p:style>
+                  <p:txBody>
+                    <a:bodyPr rtlCol="0" anchor="ctr"/>
+                    <a:lstStyle/>
+                    <a:p>
+                      <a:pPr algn="ctr"/>
+                      <a:endParaRPr lang="en-US"/>
+                    </a:p>
+                  </p:txBody>
+                </p:sp>
+                <p:sp>
+                  <p:nvSpPr>
+                    <p:cNvPr id="11" name="Forme libre 10"/>
+                    <p:cNvSpPr/>
+                    <p:nvPr/>
+                  </p:nvSpPr>
+                  <p:spPr>
+                    <a:xfrm>
+                      <a:off x="2081404" y="4331591"/>
+                      <a:ext cx="1503747" cy="1605939"/>
+                    </a:xfrm>
+                    <a:custGeom>
+                      <a:avLst/>
+                      <a:gdLst>
+                        <a:gd name="connsiteX0" fmla="*/ 465 w 1097745"/>
+                        <a:gd name="connsiteY0" fmla="*/ 880 h 1060060"/>
+                        <a:gd name="connsiteX1" fmla="*/ 335745 w 1097745"/>
+                        <a:gd name="connsiteY1" fmla="*/ 126610 h 1060060"/>
+                        <a:gd name="connsiteX2" fmla="*/ 419565 w 1097745"/>
+                        <a:gd name="connsiteY2" fmla="*/ 134230 h 1060060"/>
+                        <a:gd name="connsiteX3" fmla="*/ 1097745 w 1097745"/>
+                        <a:gd name="connsiteY3" fmla="*/ 69460 h 1060060"/>
+                        <a:gd name="connsiteX4" fmla="*/ 1097745 w 1097745"/>
+                        <a:gd name="connsiteY4" fmla="*/ 69460 h 1060060"/>
+                        <a:gd name="connsiteX5" fmla="*/ 522435 w 1097745"/>
+                        <a:gd name="connsiteY5" fmla="*/ 218050 h 1060060"/>
+                        <a:gd name="connsiteX6" fmla="*/ 461475 w 1097745"/>
+                        <a:gd name="connsiteY6" fmla="*/ 252340 h 1060060"/>
+                        <a:gd name="connsiteX7" fmla="*/ 419565 w 1097745"/>
+                        <a:gd name="connsiteY7" fmla="*/ 305680 h 1060060"/>
+                        <a:gd name="connsiteX8" fmla="*/ 404325 w 1097745"/>
+                        <a:gd name="connsiteY8" fmla="*/ 366640 h 1060060"/>
+                        <a:gd name="connsiteX9" fmla="*/ 331935 w 1097745"/>
+                        <a:gd name="connsiteY9" fmla="*/ 1060060 h 1060060"/>
+                        <a:gd name="connsiteX10" fmla="*/ 331935 w 1097745"/>
+                        <a:gd name="connsiteY10" fmla="*/ 1060060 h 1060060"/>
+                        <a:gd name="connsiteX11" fmla="*/ 305265 w 1097745"/>
+                        <a:gd name="connsiteY11" fmla="*/ 320920 h 1060060"/>
+                        <a:gd name="connsiteX12" fmla="*/ 293835 w 1097745"/>
+                        <a:gd name="connsiteY12" fmla="*/ 256150 h 1060060"/>
+                        <a:gd name="connsiteX13" fmla="*/ 263355 w 1097745"/>
+                        <a:gd name="connsiteY13" fmla="*/ 199000 h 1060060"/>
+                        <a:gd name="connsiteX14" fmla="*/ 465 w 1097745"/>
+                        <a:gd name="connsiteY14" fmla="*/ 880 h 1060060"/>
+                        <a:gd name="connsiteX0" fmla="*/ 465 w 1097745"/>
+                        <a:gd name="connsiteY0" fmla="*/ 880 h 1060060"/>
+                        <a:gd name="connsiteX1" fmla="*/ 335745 w 1097745"/>
+                        <a:gd name="connsiteY1" fmla="*/ 126610 h 1060060"/>
+                        <a:gd name="connsiteX2" fmla="*/ 419565 w 1097745"/>
+                        <a:gd name="connsiteY2" fmla="*/ 134230 h 1060060"/>
+                        <a:gd name="connsiteX3" fmla="*/ 1097745 w 1097745"/>
+                        <a:gd name="connsiteY3" fmla="*/ 69460 h 1060060"/>
+                        <a:gd name="connsiteX4" fmla="*/ 1097745 w 1097745"/>
+                        <a:gd name="connsiteY4" fmla="*/ 69460 h 1060060"/>
+                        <a:gd name="connsiteX5" fmla="*/ 522435 w 1097745"/>
+                        <a:gd name="connsiteY5" fmla="*/ 218050 h 1060060"/>
+                        <a:gd name="connsiteX6" fmla="*/ 419565 w 1097745"/>
+                        <a:gd name="connsiteY6" fmla="*/ 305680 h 1060060"/>
+                        <a:gd name="connsiteX7" fmla="*/ 404325 w 1097745"/>
+                        <a:gd name="connsiteY7" fmla="*/ 366640 h 1060060"/>
+                        <a:gd name="connsiteX8" fmla="*/ 331935 w 1097745"/>
+                        <a:gd name="connsiteY8" fmla="*/ 1060060 h 1060060"/>
+                        <a:gd name="connsiteX9" fmla="*/ 331935 w 1097745"/>
+                        <a:gd name="connsiteY9" fmla="*/ 1060060 h 1060060"/>
+                        <a:gd name="connsiteX10" fmla="*/ 305265 w 1097745"/>
+                        <a:gd name="connsiteY10" fmla="*/ 320920 h 1060060"/>
+                        <a:gd name="connsiteX11" fmla="*/ 293835 w 1097745"/>
+                        <a:gd name="connsiteY11" fmla="*/ 256150 h 1060060"/>
+                        <a:gd name="connsiteX12" fmla="*/ 263355 w 1097745"/>
+                        <a:gd name="connsiteY12" fmla="*/ 199000 h 1060060"/>
+                        <a:gd name="connsiteX13" fmla="*/ 465 w 1097745"/>
+                        <a:gd name="connsiteY13" fmla="*/ 880 h 1060060"/>
+                        <a:gd name="connsiteX0" fmla="*/ 465 w 1097745"/>
+                        <a:gd name="connsiteY0" fmla="*/ 880 h 1060060"/>
+                        <a:gd name="connsiteX1" fmla="*/ 335745 w 1097745"/>
+                        <a:gd name="connsiteY1" fmla="*/ 126610 h 1060060"/>
+                        <a:gd name="connsiteX2" fmla="*/ 419565 w 1097745"/>
+                        <a:gd name="connsiteY2" fmla="*/ 134230 h 1060060"/>
+                        <a:gd name="connsiteX3" fmla="*/ 1097745 w 1097745"/>
+                        <a:gd name="connsiteY3" fmla="*/ 69460 h 1060060"/>
+                        <a:gd name="connsiteX4" fmla="*/ 1097745 w 1097745"/>
+                        <a:gd name="connsiteY4" fmla="*/ 69460 h 1060060"/>
+                        <a:gd name="connsiteX5" fmla="*/ 522435 w 1097745"/>
+                        <a:gd name="connsiteY5" fmla="*/ 218050 h 1060060"/>
+                        <a:gd name="connsiteX6" fmla="*/ 404325 w 1097745"/>
+                        <a:gd name="connsiteY6" fmla="*/ 366640 h 1060060"/>
+                        <a:gd name="connsiteX7" fmla="*/ 331935 w 1097745"/>
+                        <a:gd name="connsiteY7" fmla="*/ 1060060 h 1060060"/>
+                        <a:gd name="connsiteX8" fmla="*/ 331935 w 1097745"/>
+                        <a:gd name="connsiteY8" fmla="*/ 1060060 h 1060060"/>
+                        <a:gd name="connsiteX9" fmla="*/ 305265 w 1097745"/>
+                        <a:gd name="connsiteY9" fmla="*/ 320920 h 1060060"/>
+                        <a:gd name="connsiteX10" fmla="*/ 293835 w 1097745"/>
+                        <a:gd name="connsiteY10" fmla="*/ 256150 h 1060060"/>
+                        <a:gd name="connsiteX11" fmla="*/ 263355 w 1097745"/>
+                        <a:gd name="connsiteY11" fmla="*/ 199000 h 1060060"/>
+                        <a:gd name="connsiteX12" fmla="*/ 465 w 1097745"/>
+                        <a:gd name="connsiteY12" fmla="*/ 880 h 1060060"/>
+                        <a:gd name="connsiteX0" fmla="*/ 465 w 1097745"/>
+                        <a:gd name="connsiteY0" fmla="*/ 880 h 1060060"/>
+                        <a:gd name="connsiteX1" fmla="*/ 335745 w 1097745"/>
+                        <a:gd name="connsiteY1" fmla="*/ 126610 h 1060060"/>
+                        <a:gd name="connsiteX2" fmla="*/ 419565 w 1097745"/>
+                        <a:gd name="connsiteY2" fmla="*/ 134230 h 1060060"/>
+                        <a:gd name="connsiteX3" fmla="*/ 1097745 w 1097745"/>
+                        <a:gd name="connsiteY3" fmla="*/ 69460 h 1060060"/>
+                        <a:gd name="connsiteX4" fmla="*/ 1097745 w 1097745"/>
+                        <a:gd name="connsiteY4" fmla="*/ 69460 h 1060060"/>
+                        <a:gd name="connsiteX5" fmla="*/ 522435 w 1097745"/>
+                        <a:gd name="connsiteY5" fmla="*/ 218050 h 1060060"/>
+                        <a:gd name="connsiteX6" fmla="*/ 404325 w 1097745"/>
+                        <a:gd name="connsiteY6" fmla="*/ 366640 h 1060060"/>
+                        <a:gd name="connsiteX7" fmla="*/ 331935 w 1097745"/>
+                        <a:gd name="connsiteY7" fmla="*/ 1060060 h 1060060"/>
+                        <a:gd name="connsiteX8" fmla="*/ 331935 w 1097745"/>
+                        <a:gd name="connsiteY8" fmla="*/ 1060060 h 1060060"/>
+                        <a:gd name="connsiteX9" fmla="*/ 305265 w 1097745"/>
+                        <a:gd name="connsiteY9" fmla="*/ 320920 h 1060060"/>
+                        <a:gd name="connsiteX10" fmla="*/ 293835 w 1097745"/>
+                        <a:gd name="connsiteY10" fmla="*/ 256150 h 1060060"/>
+                        <a:gd name="connsiteX11" fmla="*/ 263355 w 1097745"/>
+                        <a:gd name="connsiteY11" fmla="*/ 199000 h 1060060"/>
+                        <a:gd name="connsiteX12" fmla="*/ 465 w 1097745"/>
+                        <a:gd name="connsiteY12" fmla="*/ 880 h 1060060"/>
+                        <a:gd name="connsiteX0" fmla="*/ 110 w 1097390"/>
+                        <a:gd name="connsiteY0" fmla="*/ 1124 h 1060304"/>
+                        <a:gd name="connsiteX1" fmla="*/ 297290 w 1097390"/>
+                        <a:gd name="connsiteY1" fmla="*/ 119234 h 1060304"/>
+                        <a:gd name="connsiteX2" fmla="*/ 419210 w 1097390"/>
+                        <a:gd name="connsiteY2" fmla="*/ 134474 h 1060304"/>
+                        <a:gd name="connsiteX3" fmla="*/ 1097390 w 1097390"/>
+                        <a:gd name="connsiteY3" fmla="*/ 69704 h 1060304"/>
+                        <a:gd name="connsiteX4" fmla="*/ 1097390 w 1097390"/>
+                        <a:gd name="connsiteY4" fmla="*/ 69704 h 1060304"/>
+                        <a:gd name="connsiteX5" fmla="*/ 522080 w 1097390"/>
+                        <a:gd name="connsiteY5" fmla="*/ 218294 h 1060304"/>
+                        <a:gd name="connsiteX6" fmla="*/ 403970 w 1097390"/>
+                        <a:gd name="connsiteY6" fmla="*/ 366884 h 1060304"/>
+                        <a:gd name="connsiteX7" fmla="*/ 331580 w 1097390"/>
+                        <a:gd name="connsiteY7" fmla="*/ 1060304 h 1060304"/>
+                        <a:gd name="connsiteX8" fmla="*/ 331580 w 1097390"/>
+                        <a:gd name="connsiteY8" fmla="*/ 1060304 h 1060304"/>
+                        <a:gd name="connsiteX9" fmla="*/ 304910 w 1097390"/>
+                        <a:gd name="connsiteY9" fmla="*/ 321164 h 1060304"/>
+                        <a:gd name="connsiteX10" fmla="*/ 293480 w 1097390"/>
+                        <a:gd name="connsiteY10" fmla="*/ 256394 h 1060304"/>
+                        <a:gd name="connsiteX11" fmla="*/ 263000 w 1097390"/>
+                        <a:gd name="connsiteY11" fmla="*/ 199244 h 1060304"/>
+                        <a:gd name="connsiteX12" fmla="*/ 110 w 1097390"/>
+                        <a:gd name="connsiteY12" fmla="*/ 1124 h 1060304"/>
+                        <a:gd name="connsiteX0" fmla="*/ 110 w 1097390"/>
+                        <a:gd name="connsiteY0" fmla="*/ 1124 h 1060304"/>
+                        <a:gd name="connsiteX1" fmla="*/ 297290 w 1097390"/>
+                        <a:gd name="connsiteY1" fmla="*/ 119234 h 1060304"/>
+                        <a:gd name="connsiteX2" fmla="*/ 419210 w 1097390"/>
+                        <a:gd name="connsiteY2" fmla="*/ 134474 h 1060304"/>
+                        <a:gd name="connsiteX3" fmla="*/ 1097390 w 1097390"/>
+                        <a:gd name="connsiteY3" fmla="*/ 69704 h 1060304"/>
+                        <a:gd name="connsiteX4" fmla="*/ 1097390 w 1097390"/>
+                        <a:gd name="connsiteY4" fmla="*/ 69704 h 1060304"/>
+                        <a:gd name="connsiteX5" fmla="*/ 522080 w 1097390"/>
+                        <a:gd name="connsiteY5" fmla="*/ 218294 h 1060304"/>
+                        <a:gd name="connsiteX6" fmla="*/ 403970 w 1097390"/>
+                        <a:gd name="connsiteY6" fmla="*/ 366884 h 1060304"/>
+                        <a:gd name="connsiteX7" fmla="*/ 331580 w 1097390"/>
+                        <a:gd name="connsiteY7" fmla="*/ 1060304 h 1060304"/>
+                        <a:gd name="connsiteX8" fmla="*/ 331580 w 1097390"/>
+                        <a:gd name="connsiteY8" fmla="*/ 1060304 h 1060304"/>
+                        <a:gd name="connsiteX9" fmla="*/ 304910 w 1097390"/>
+                        <a:gd name="connsiteY9" fmla="*/ 321164 h 1060304"/>
+                        <a:gd name="connsiteX10" fmla="*/ 293480 w 1097390"/>
+                        <a:gd name="connsiteY10" fmla="*/ 256394 h 1060304"/>
+                        <a:gd name="connsiteX11" fmla="*/ 263000 w 1097390"/>
+                        <a:gd name="connsiteY11" fmla="*/ 199244 h 1060304"/>
+                        <a:gd name="connsiteX12" fmla="*/ 110 w 1097390"/>
+                        <a:gd name="connsiteY12" fmla="*/ 1124 h 1060304"/>
+                        <a:gd name="connsiteX0" fmla="*/ 110 w 1097390"/>
+                        <a:gd name="connsiteY0" fmla="*/ 1124 h 1060304"/>
+                        <a:gd name="connsiteX1" fmla="*/ 297290 w 1097390"/>
+                        <a:gd name="connsiteY1" fmla="*/ 119234 h 1060304"/>
+                        <a:gd name="connsiteX2" fmla="*/ 419210 w 1097390"/>
+                        <a:gd name="connsiteY2" fmla="*/ 134474 h 1060304"/>
+                        <a:gd name="connsiteX3" fmla="*/ 1097390 w 1097390"/>
+                        <a:gd name="connsiteY3" fmla="*/ 69704 h 1060304"/>
+                        <a:gd name="connsiteX4" fmla="*/ 1097390 w 1097390"/>
+                        <a:gd name="connsiteY4" fmla="*/ 69704 h 1060304"/>
+                        <a:gd name="connsiteX5" fmla="*/ 522080 w 1097390"/>
+                        <a:gd name="connsiteY5" fmla="*/ 218294 h 1060304"/>
+                        <a:gd name="connsiteX6" fmla="*/ 403970 w 1097390"/>
+                        <a:gd name="connsiteY6" fmla="*/ 366884 h 1060304"/>
+                        <a:gd name="connsiteX7" fmla="*/ 331580 w 1097390"/>
+                        <a:gd name="connsiteY7" fmla="*/ 1060304 h 1060304"/>
+                        <a:gd name="connsiteX8" fmla="*/ 331580 w 1097390"/>
+                        <a:gd name="connsiteY8" fmla="*/ 1060304 h 1060304"/>
+                        <a:gd name="connsiteX9" fmla="*/ 304910 w 1097390"/>
+                        <a:gd name="connsiteY9" fmla="*/ 321164 h 1060304"/>
+                        <a:gd name="connsiteX10" fmla="*/ 293480 w 1097390"/>
+                        <a:gd name="connsiteY10" fmla="*/ 256394 h 1060304"/>
+                        <a:gd name="connsiteX11" fmla="*/ 263000 w 1097390"/>
+                        <a:gd name="connsiteY11" fmla="*/ 199244 h 1060304"/>
+                        <a:gd name="connsiteX12" fmla="*/ 110 w 1097390"/>
+                        <a:gd name="connsiteY12" fmla="*/ 1124 h 1060304"/>
+                        <a:gd name="connsiteX0" fmla="*/ 110 w 1097390"/>
+                        <a:gd name="connsiteY0" fmla="*/ 1124 h 1060304"/>
+                        <a:gd name="connsiteX1" fmla="*/ 297290 w 1097390"/>
+                        <a:gd name="connsiteY1" fmla="*/ 119234 h 1060304"/>
+                        <a:gd name="connsiteX2" fmla="*/ 442070 w 1097390"/>
+                        <a:gd name="connsiteY2" fmla="*/ 134474 h 1060304"/>
+                        <a:gd name="connsiteX3" fmla="*/ 1097390 w 1097390"/>
+                        <a:gd name="connsiteY3" fmla="*/ 69704 h 1060304"/>
+                        <a:gd name="connsiteX4" fmla="*/ 1097390 w 1097390"/>
+                        <a:gd name="connsiteY4" fmla="*/ 69704 h 1060304"/>
+                        <a:gd name="connsiteX5" fmla="*/ 522080 w 1097390"/>
+                        <a:gd name="connsiteY5" fmla="*/ 218294 h 1060304"/>
+                        <a:gd name="connsiteX6" fmla="*/ 403970 w 1097390"/>
+                        <a:gd name="connsiteY6" fmla="*/ 366884 h 1060304"/>
+                        <a:gd name="connsiteX7" fmla="*/ 331580 w 1097390"/>
+                        <a:gd name="connsiteY7" fmla="*/ 1060304 h 1060304"/>
+                        <a:gd name="connsiteX8" fmla="*/ 331580 w 1097390"/>
+                        <a:gd name="connsiteY8" fmla="*/ 1060304 h 1060304"/>
+                        <a:gd name="connsiteX9" fmla="*/ 304910 w 1097390"/>
+                        <a:gd name="connsiteY9" fmla="*/ 321164 h 1060304"/>
+                        <a:gd name="connsiteX10" fmla="*/ 293480 w 1097390"/>
+                        <a:gd name="connsiteY10" fmla="*/ 256394 h 1060304"/>
+                        <a:gd name="connsiteX11" fmla="*/ 263000 w 1097390"/>
+                        <a:gd name="connsiteY11" fmla="*/ 199244 h 1060304"/>
+                        <a:gd name="connsiteX12" fmla="*/ 110 w 1097390"/>
+                        <a:gd name="connsiteY12" fmla="*/ 1124 h 1060304"/>
+                        <a:gd name="connsiteX0" fmla="*/ 110 w 1097390"/>
+                        <a:gd name="connsiteY0" fmla="*/ 1124 h 1060304"/>
+                        <a:gd name="connsiteX1" fmla="*/ 297290 w 1097390"/>
+                        <a:gd name="connsiteY1" fmla="*/ 119234 h 1060304"/>
+                        <a:gd name="connsiteX2" fmla="*/ 442070 w 1097390"/>
+                        <a:gd name="connsiteY2" fmla="*/ 134474 h 1060304"/>
+                        <a:gd name="connsiteX3" fmla="*/ 1097390 w 1097390"/>
+                        <a:gd name="connsiteY3" fmla="*/ 69704 h 1060304"/>
+                        <a:gd name="connsiteX4" fmla="*/ 1097390 w 1097390"/>
+                        <a:gd name="connsiteY4" fmla="*/ 69704 h 1060304"/>
+                        <a:gd name="connsiteX5" fmla="*/ 522080 w 1097390"/>
+                        <a:gd name="connsiteY5" fmla="*/ 218294 h 1060304"/>
+                        <a:gd name="connsiteX6" fmla="*/ 403970 w 1097390"/>
+                        <a:gd name="connsiteY6" fmla="*/ 366884 h 1060304"/>
+                        <a:gd name="connsiteX7" fmla="*/ 331580 w 1097390"/>
+                        <a:gd name="connsiteY7" fmla="*/ 1060304 h 1060304"/>
+                        <a:gd name="connsiteX8" fmla="*/ 331580 w 1097390"/>
+                        <a:gd name="connsiteY8" fmla="*/ 1060304 h 1060304"/>
+                        <a:gd name="connsiteX9" fmla="*/ 304910 w 1097390"/>
+                        <a:gd name="connsiteY9" fmla="*/ 321164 h 1060304"/>
+                        <a:gd name="connsiteX10" fmla="*/ 263000 w 1097390"/>
+                        <a:gd name="connsiteY10" fmla="*/ 199244 h 1060304"/>
+                        <a:gd name="connsiteX11" fmla="*/ 110 w 1097390"/>
+                        <a:gd name="connsiteY11" fmla="*/ 1124 h 1060304"/>
+                        <a:gd name="connsiteX0" fmla="*/ 284 w 1097564"/>
+                        <a:gd name="connsiteY0" fmla="*/ 807 h 1059987"/>
+                        <a:gd name="connsiteX1" fmla="*/ 297464 w 1097564"/>
+                        <a:gd name="connsiteY1" fmla="*/ 118917 h 1059987"/>
+                        <a:gd name="connsiteX2" fmla="*/ 442244 w 1097564"/>
+                        <a:gd name="connsiteY2" fmla="*/ 134157 h 1059987"/>
+                        <a:gd name="connsiteX3" fmla="*/ 1097564 w 1097564"/>
+                        <a:gd name="connsiteY3" fmla="*/ 69387 h 1059987"/>
+                        <a:gd name="connsiteX4" fmla="*/ 1097564 w 1097564"/>
+                        <a:gd name="connsiteY4" fmla="*/ 69387 h 1059987"/>
+                        <a:gd name="connsiteX5" fmla="*/ 522254 w 1097564"/>
+                        <a:gd name="connsiteY5" fmla="*/ 217977 h 1059987"/>
+                        <a:gd name="connsiteX6" fmla="*/ 404144 w 1097564"/>
+                        <a:gd name="connsiteY6" fmla="*/ 366567 h 1059987"/>
+                        <a:gd name="connsiteX7" fmla="*/ 331754 w 1097564"/>
+                        <a:gd name="connsiteY7" fmla="*/ 1059987 h 1059987"/>
+                        <a:gd name="connsiteX8" fmla="*/ 331754 w 1097564"/>
+                        <a:gd name="connsiteY8" fmla="*/ 1059987 h 1059987"/>
+                        <a:gd name="connsiteX9" fmla="*/ 305084 w 1097564"/>
+                        <a:gd name="connsiteY9" fmla="*/ 320847 h 1059987"/>
+                        <a:gd name="connsiteX10" fmla="*/ 244124 w 1097564"/>
+                        <a:gd name="connsiteY10" fmla="*/ 185592 h 1059987"/>
+                        <a:gd name="connsiteX11" fmla="*/ 284 w 1097564"/>
+                        <a:gd name="connsiteY11" fmla="*/ 807 h 1059987"/>
+                        <a:gd name="connsiteX0" fmla="*/ 303 w 1097583"/>
+                        <a:gd name="connsiteY0" fmla="*/ 807 h 1059987"/>
+                        <a:gd name="connsiteX1" fmla="*/ 297483 w 1097583"/>
+                        <a:gd name="connsiteY1" fmla="*/ 118917 h 1059987"/>
+                        <a:gd name="connsiteX2" fmla="*/ 442263 w 1097583"/>
+                        <a:gd name="connsiteY2" fmla="*/ 134157 h 1059987"/>
+                        <a:gd name="connsiteX3" fmla="*/ 1097583 w 1097583"/>
+                        <a:gd name="connsiteY3" fmla="*/ 69387 h 1059987"/>
+                        <a:gd name="connsiteX4" fmla="*/ 1097583 w 1097583"/>
+                        <a:gd name="connsiteY4" fmla="*/ 69387 h 1059987"/>
+                        <a:gd name="connsiteX5" fmla="*/ 522273 w 1097583"/>
+                        <a:gd name="connsiteY5" fmla="*/ 217977 h 1059987"/>
+                        <a:gd name="connsiteX6" fmla="*/ 404163 w 1097583"/>
+                        <a:gd name="connsiteY6" fmla="*/ 366567 h 1059987"/>
+                        <a:gd name="connsiteX7" fmla="*/ 331773 w 1097583"/>
+                        <a:gd name="connsiteY7" fmla="*/ 1059987 h 1059987"/>
+                        <a:gd name="connsiteX8" fmla="*/ 331773 w 1097583"/>
+                        <a:gd name="connsiteY8" fmla="*/ 1059987 h 1059987"/>
+                        <a:gd name="connsiteX9" fmla="*/ 305103 w 1097583"/>
+                        <a:gd name="connsiteY9" fmla="*/ 320847 h 1059987"/>
+                        <a:gd name="connsiteX10" fmla="*/ 244143 w 1097583"/>
+                        <a:gd name="connsiteY10" fmla="*/ 185592 h 1059987"/>
+                        <a:gd name="connsiteX11" fmla="*/ 303 w 1097583"/>
+                        <a:gd name="connsiteY11" fmla="*/ 807 h 1059987"/>
+                        <a:gd name="connsiteX0" fmla="*/ 303 w 1097583"/>
+                        <a:gd name="connsiteY0" fmla="*/ 807 h 1059987"/>
+                        <a:gd name="connsiteX1" fmla="*/ 297483 w 1097583"/>
+                        <a:gd name="connsiteY1" fmla="*/ 118917 h 1059987"/>
+                        <a:gd name="connsiteX2" fmla="*/ 442263 w 1097583"/>
+                        <a:gd name="connsiteY2" fmla="*/ 134157 h 1059987"/>
+                        <a:gd name="connsiteX3" fmla="*/ 1097583 w 1097583"/>
+                        <a:gd name="connsiteY3" fmla="*/ 69387 h 1059987"/>
+                        <a:gd name="connsiteX4" fmla="*/ 1097583 w 1097583"/>
+                        <a:gd name="connsiteY4" fmla="*/ 69387 h 1059987"/>
+                        <a:gd name="connsiteX5" fmla="*/ 522273 w 1097583"/>
+                        <a:gd name="connsiteY5" fmla="*/ 217977 h 1059987"/>
+                        <a:gd name="connsiteX6" fmla="*/ 404163 w 1097583"/>
+                        <a:gd name="connsiteY6" fmla="*/ 366567 h 1059987"/>
+                        <a:gd name="connsiteX7" fmla="*/ 331773 w 1097583"/>
+                        <a:gd name="connsiteY7" fmla="*/ 1059987 h 1059987"/>
+                        <a:gd name="connsiteX8" fmla="*/ 331773 w 1097583"/>
+                        <a:gd name="connsiteY8" fmla="*/ 1059987 h 1059987"/>
+                        <a:gd name="connsiteX9" fmla="*/ 305103 w 1097583"/>
+                        <a:gd name="connsiteY9" fmla="*/ 320847 h 1059987"/>
+                        <a:gd name="connsiteX10" fmla="*/ 244143 w 1097583"/>
+                        <a:gd name="connsiteY10" fmla="*/ 185592 h 1059987"/>
+                        <a:gd name="connsiteX11" fmla="*/ 303 w 1097583"/>
+                        <a:gd name="connsiteY11" fmla="*/ 807 h 1059987"/>
+                      </a:gdLst>
+                      <a:ahLst/>
+                      <a:cxnLst>
+                        <a:cxn ang="0">
+                          <a:pos x="connsiteX0" y="connsiteY0"/>
+                        </a:cxn>
+                        <a:cxn ang="0">
+                          <a:pos x="connsiteX1" y="connsiteY1"/>
+                        </a:cxn>
+                        <a:cxn ang="0">
+                          <a:pos x="connsiteX2" y="connsiteY2"/>
+                        </a:cxn>
+                        <a:cxn ang="0">
+                          <a:pos x="connsiteX3" y="connsiteY3"/>
+                        </a:cxn>
+                        <a:cxn ang="0">
+                          <a:pos x="connsiteX4" y="connsiteY4"/>
+                        </a:cxn>
+                        <a:cxn ang="0">
+                          <a:pos x="connsiteX5" y="connsiteY5"/>
+                        </a:cxn>
+                        <a:cxn ang="0">
+                          <a:pos x="connsiteX6" y="connsiteY6"/>
+                        </a:cxn>
+                        <a:cxn ang="0">
+                          <a:pos x="connsiteX7" y="connsiteY7"/>
+                        </a:cxn>
+                        <a:cxn ang="0">
+                          <a:pos x="connsiteX8" y="connsiteY8"/>
+                        </a:cxn>
+                        <a:cxn ang="0">
+                          <a:pos x="connsiteX9" y="connsiteY9"/>
+                        </a:cxn>
+                        <a:cxn ang="0">
+                          <a:pos x="connsiteX10" y="connsiteY10"/>
+                        </a:cxn>
+                        <a:cxn ang="0">
+                          <a:pos x="connsiteX11" y="connsiteY11"/>
+                        </a:cxn>
+                      </a:cxnLst>
+                      <a:rect l="l" t="t" r="r" b="b"/>
+                      <a:pathLst>
+                        <a:path w="1097583" h="1059987">
+                          <a:moveTo>
+                            <a:pt x="303" y="807"/>
+                          </a:moveTo>
+                          <a:cubicBezTo>
+                            <a:pt x="9193" y="-10306"/>
+                            <a:pt x="223823" y="96692"/>
+                            <a:pt x="297483" y="118917"/>
+                          </a:cubicBezTo>
+                          <a:cubicBezTo>
+                            <a:pt x="371143" y="141142"/>
+                            <a:pt x="360348" y="144317"/>
+                            <a:pt x="442263" y="134157"/>
+                          </a:cubicBezTo>
+                          <a:cubicBezTo>
+                            <a:pt x="524178" y="123997"/>
+                            <a:pt x="988363" y="80182"/>
+                            <a:pt x="1097583" y="69387"/>
+                          </a:cubicBezTo>
+                          <a:lnTo>
+                            <a:pt x="1097583" y="69387"/>
+                          </a:lnTo>
+                          <a:lnTo>
+                            <a:pt x="522273" y="217977"/>
+                          </a:lnTo>
+                          <a:cubicBezTo>
+                            <a:pt x="406703" y="267507"/>
+                            <a:pt x="420673" y="277667"/>
+                            <a:pt x="404163" y="366567"/>
+                          </a:cubicBezTo>
+                          <a:cubicBezTo>
+                            <a:pt x="387653" y="455467"/>
+                            <a:pt x="331773" y="1059987"/>
+                            <a:pt x="331773" y="1059987"/>
+                          </a:cubicBezTo>
+                          <a:lnTo>
+                            <a:pt x="331773" y="1059987"/>
+                          </a:lnTo>
+                          <a:cubicBezTo>
+                            <a:pt x="327328" y="936797"/>
+                            <a:pt x="317803" y="401809"/>
+                            <a:pt x="305103" y="320847"/>
+                          </a:cubicBezTo>
+                          <a:cubicBezTo>
+                            <a:pt x="292403" y="239885"/>
+                            <a:pt x="308278" y="237027"/>
+                            <a:pt x="244143" y="185592"/>
+                          </a:cubicBezTo>
+                          <a:cubicBezTo>
+                            <a:pt x="180008" y="134157"/>
+                            <a:pt x="-8587" y="11920"/>
+                            <a:pt x="303" y="807"/>
+                          </a:cubicBezTo>
+                          <a:close/>
+                        </a:path>
+                      </a:pathLst>
+                    </a:custGeom>
+                    <a:solidFill>
+                      <a:srgbClr val="00B0F0"/>
+                    </a:solidFill>
+                    <a:ln>
+                      <a:noFill/>
+                    </a:ln>
+                  </p:spPr>
+                  <p:style>
+                    <a:lnRef idx="2">
+                      <a:schemeClr val="accent1">
+                        <a:shade val="50000"/>
+                      </a:schemeClr>
+                    </a:lnRef>
+                    <a:fillRef idx="1">
+                      <a:schemeClr val="accent1"/>
+                    </a:fillRef>
+                    <a:effectRef idx="0">
+                      <a:schemeClr val="accent1"/>
+                    </a:effectRef>
+                    <a:fontRef idx="minor">
+                      <a:schemeClr val="lt1"/>
+                    </a:fontRef>
+                  </p:style>
+                  <p:txBody>
+                    <a:bodyPr rtlCol="0" anchor="ctr"/>
+                    <a:lstStyle/>
+                    <a:p>
+                      <a:pPr algn="ctr"/>
+                      <a:endParaRPr lang="en-US"/>
+                    </a:p>
+                  </p:txBody>
+                </p:sp>
+              </p:grpSp>
+              <p:sp>
+                <p:nvSpPr>
+                  <p:cNvPr id="9" name="Cube 8"/>
+                  <p:cNvSpPr/>
+                  <p:nvPr/>
+                </p:nvSpPr>
+                <p:spPr>
+                  <a:xfrm>
+                    <a:off x="1143387" y="3055508"/>
+                    <a:ext cx="3363190" cy="3336240"/>
+                  </a:xfrm>
+                  <a:prstGeom prst="cube">
+                    <a:avLst>
+                      <a:gd name="adj" fmla="val 25320"/>
+                    </a:avLst>
+                  </a:prstGeom>
+                  <a:noFill/>
+                  <a:ln w="38100">
+                    <a:solidFill>
+                      <a:srgbClr val="00B0F0"/>
+                    </a:solidFill>
+                  </a:ln>
+                </p:spPr>
+                <p:style>
+                  <a:lnRef idx="2">
+                    <a:schemeClr val="accent1">
+                      <a:shade val="50000"/>
+                    </a:schemeClr>
+                  </a:lnRef>
+                  <a:fillRef idx="1">
+                    <a:schemeClr val="accent1"/>
+                  </a:fillRef>
+                  <a:effectRef idx="0">
+                    <a:schemeClr val="accent1"/>
+                  </a:effectRef>
+                  <a:fontRef idx="minor">
+                    <a:schemeClr val="lt1"/>
+                  </a:fontRef>
+                </p:style>
+                <p:txBody>
+                  <a:bodyPr rtlCol="0" anchor="ctr"/>
+                  <a:lstStyle/>
+                  <a:p>
+                    <a:pPr algn="ctr"/>
+                    <a:endParaRPr lang="en-US"/>
+                  </a:p>
+                </p:txBody>
+              </p:sp>
+            </p:grpSp>
+            <p:cxnSp>
+              <p:nvCxnSpPr>
+                <p:cNvPr id="7" name="Connecteur droit 6"/>
+                <p:cNvCxnSpPr/>
+                <p:nvPr/>
+              </p:nvCxnSpPr>
+              <p:spPr>
+                <a:xfrm flipH="1">
+                  <a:off x="1985500" y="3055508"/>
+                  <a:ext cx="0" cy="1519332"/>
+                </a:xfrm>
+                <a:prstGeom prst="line">
+                  <a:avLst/>
+                </a:prstGeom>
+                <a:ln w="38100">
+                  <a:solidFill>
+                    <a:srgbClr val="00B0F0"/>
+                  </a:solidFill>
+                  <a:prstDash val="dash"/>
+                </a:ln>
+              </p:spPr>
+              <p:style>
+                <a:lnRef idx="1">
+                  <a:schemeClr val="accent1"/>
+                </a:lnRef>
+                <a:fillRef idx="0">
+                  <a:schemeClr val="accent1"/>
+                </a:fillRef>
+                <a:effectRef idx="0">
+                  <a:schemeClr val="accent1"/>
+                </a:effectRef>
+                <a:fontRef idx="minor">
+                  <a:schemeClr val="tx1"/>
+                </a:fontRef>
+              </p:style>
+            </p:cxnSp>
+          </p:grpSp>
+          <p:sp>
+            <p:nvSpPr>
+              <p:cNvPr id="12" name="Ellipse 11"/>
+              <p:cNvSpPr/>
+              <p:nvPr/>
+            </p:nvSpPr>
+            <p:spPr>
+              <a:xfrm>
+                <a:off x="2111595" y="832105"/>
+                <a:ext cx="1027442" cy="800300"/>
+              </a:xfrm>
+              <a:prstGeom prst="ellipse">
+                <a:avLst/>
+              </a:prstGeom>
+              <a:solidFill>
+                <a:schemeClr val="bg1"/>
+              </a:solidFill>
+              <a:ln w="76200">
+                <a:solidFill>
+                  <a:srgbClr val="00B0F0"/>
+                </a:solidFill>
+              </a:ln>
+            </p:spPr>
+            <p:style>
+              <a:lnRef idx="2">
+                <a:schemeClr val="accent1">
+                  <a:shade val="50000"/>
+                </a:schemeClr>
+              </a:lnRef>
+              <a:fillRef idx="1">
+                <a:schemeClr val="accent1"/>
+              </a:fillRef>
+              <a:effectRef idx="0">
+                <a:schemeClr val="accent1"/>
+              </a:effectRef>
+              <a:fontRef idx="minor">
+                <a:schemeClr val="lt1"/>
+              </a:fontRef>
+            </p:style>
+            <p:txBody>
+              <a:bodyPr rtlCol="0" anchor="ctr"/>
+              <a:lstStyle/>
+              <a:p>
+                <a:pPr algn="ctr"/>
+                <a:endParaRPr lang="en-US"/>
+              </a:p>
+            </p:txBody>
+          </p:sp>
+        </p:grpSp>
+        <p:sp>
+          <p:nvSpPr>
+            <p:cNvPr id="15" name="ZoneTexte 14"/>
+            <p:cNvSpPr txBox="1"/>
+            <p:nvPr/>
+          </p:nvSpPr>
+          <p:spPr>
+            <a:xfrm>
+              <a:off x="2111595" y="922386"/>
+              <a:ext cx="1027442" cy="584775"/>
+            </a:xfrm>
+            <a:prstGeom prst="rect">
+              <a:avLst/>
+            </a:prstGeom>
+            <a:noFill/>
+          </p:spPr>
+          <p:txBody>
+            <a:bodyPr wrap="square" rtlCol="0">
+              <a:spAutoFit/>
+            </a:bodyPr>
+            <a:lstStyle/>
+            <a:p>
+              <a:pPr algn="ctr"/>
+              <a:r>
+                <a:rPr lang="en-US" sz="3200" b="1" dirty="0" smtClean="0">
+                  <a:solidFill>
+                    <a:srgbClr val="00B0F0"/>
+                  </a:solidFill>
+                </a:rPr>
+                <a:t>OFF</a:t>
+              </a:r>
+              <a:endParaRPr lang="en-US" sz="3200" b="1" dirty="0">
+                <a:solidFill>
+                  <a:srgbClr val="00B0F0"/>
+                </a:solidFill>
+              </a:endParaRPr>
+            </a:p>
+          </p:txBody>
+        </p:sp>
+      </p:grpSp>
+    </p:spTree>
+    <p:extLst>
+      <p:ext uri="{BB962C8B-B14F-4D97-AF65-F5344CB8AC3E}">
+        <p14:creationId xmlns:p14="http://schemas.microsoft.com/office/powerpoint/2010/main" val="2638494338"/>
+      </p:ext>
+    </p:extLst>
+  </p:cSld>
+  <p:clrMapOvr>
+    <a:masterClrMapping/>
+  </p:clrMapOvr>
+</p:sld>
+</file>
+
+<file path=ppt/slides/slide5.xml><?xml version="1.0" encoding="utf-8"?>
+<p:sld xmlns:a="http://schemas.openxmlformats.org/drawingml/2006/main" xmlns:r="http://schemas.openxmlformats.org/officeDocument/2006/relationships" xmlns:p="http://schemas.openxmlformats.org/presentationml/2006/main">
+  <p:cSld>
     <p:bg>
       <p:bgPr>
         <a:solidFill>

</xml_diff>